<commit_message>
Inserção do link do GitHub.
</commit_message>
<xml_diff>
--- a/Seminário - A Star/A Star.pptx
+++ b/Seminário - A Star/A Star.pptx
@@ -323,6 +323,11 @@
       </a:defRPr>
     </a:lvl9pPr>
   </p:defaultTextStyle>
+  <p:extLst>
+    <p:ext uri="{EFAFB233-063F-42B5-8137-9DF3F51BA10A}">
+      <p15:sldGuideLst xmlns:p15="http://schemas.microsoft.com/office/powerpoint/2012/main"/>
+    </p:ext>
+  </p:extLst>
 </p:presentation>
 </file>
 
@@ -952,7 +957,7 @@
           </a:ln>
           <a:extLst>
             <a:ext uri="{C572A759-6A51-4108-AA02-DFA0A04FC94B}">
-              <ma14:wrappingTextBoxFlag xmlns:ma14="http://schemas.microsoft.com/office/mac/drawingml/2011/main" xmlns="" val="1"/>
+              <ma14:wrappingTextBoxFlag xmlns="" xmlns:ma14="http://schemas.microsoft.com/office/mac/drawingml/2011/main" val="1"/>
             </a:ext>
           </a:extLst>
         </p:spPr>
@@ -991,7 +996,7 @@
           </a:ln>
           <a:extLst>
             <a:ext uri="{C572A759-6A51-4108-AA02-DFA0A04FC94B}">
-              <ma14:wrappingTextBoxFlag xmlns:ma14="http://schemas.microsoft.com/office/mac/drawingml/2011/main" xmlns="" val="1"/>
+              <ma14:wrappingTextBoxFlag xmlns="" xmlns:ma14="http://schemas.microsoft.com/office/mac/drawingml/2011/main" val="1"/>
             </a:ext>
           </a:extLst>
         </p:spPr>
@@ -1981,7 +1986,7 @@
           </a:ln>
           <a:extLst>
             <a:ext uri="{C572A759-6A51-4108-AA02-DFA0A04FC94B}">
-              <ma14:wrappingTextBoxFlag xmlns:ma14="http://schemas.microsoft.com/office/mac/drawingml/2011/main" xmlns="" val="1"/>
+              <ma14:wrappingTextBoxFlag xmlns="" xmlns:ma14="http://schemas.microsoft.com/office/mac/drawingml/2011/main" val="1"/>
             </a:ext>
           </a:extLst>
         </p:spPr>
@@ -2027,7 +2032,7 @@
           </a:ln>
           <a:extLst>
             <a:ext uri="{C572A759-6A51-4108-AA02-DFA0A04FC94B}">
-              <ma14:wrappingTextBoxFlag xmlns:ma14="http://schemas.microsoft.com/office/mac/drawingml/2011/main" xmlns="" val="1"/>
+              <ma14:wrappingTextBoxFlag xmlns="" xmlns:ma14="http://schemas.microsoft.com/office/mac/drawingml/2011/main" val="1"/>
             </a:ext>
           </a:extLst>
         </p:spPr>
@@ -2103,10 +2108,15 @@
               </a:defRPr>
             </a:pPr>
             <a:r>
+              <a:rPr lang="pt-BR" dirty="0">
+                <a:hlinkClick r:id="rId2"/>
+              </a:rPr>
+              <a:t>https://github.com/FernandoLins8/Projeto-Estruturas-de-dados</a:t>
+            </a:r>
+            <a:r>
               <a:rPr lang="pt-BR" dirty="0"/>
-              <a:t>*falta colocar o GitHub*</a:t>
-            </a:r>
-            <a:endParaRPr dirty="0"/>
+              <a:t> </a:t>
+            </a:r>
           </a:p>
         </p:txBody>
       </p:sp>
@@ -2119,7 +2129,7 @@
           <p:nvPr/>
         </p:nvPicPr>
         <p:blipFill>
-          <a:blip r:embed="rId2">
+          <a:blip r:embed="rId3">
             <a:extLst/>
           </a:blip>
           <a:stretch>
@@ -2148,7 +2158,7 @@
           <p:nvPr/>
         </p:nvPicPr>
         <p:blipFill>
-          <a:blip r:embed="rId3">
+          <a:blip r:embed="rId4">
             <a:extLst/>
           </a:blip>
           <a:stretch>
@@ -2173,13 +2183,13 @@
   <p:clrMapOvr>
     <a:masterClrMapping/>
   </p:clrMapOvr>
-  <mc:AlternateContent xmlns:mc="http://schemas.openxmlformats.org/markup-compatibility/2006">
-    <mc:Choice xmlns:p14="http://schemas.microsoft.com/office/powerpoint/2010/main" Requires="p14">
+  <mc:AlternateContent xmlns:mc="http://schemas.openxmlformats.org/markup-compatibility/2006" xmlns:p14="http://schemas.microsoft.com/office/powerpoint/2010/main">
+    <mc:Choice Requires="p14">
       <p:transition spd="med" p14:dur="700">
         <p:fade/>
       </p:transition>
     </mc:Choice>
-    <mc:Fallback>
+    <mc:Fallback xmlns="">
       <p:transition spd="med">
         <p:fade/>
       </p:transition>
@@ -2935,13 +2945,13 @@
   <p:clrMapOvr>
     <a:masterClrMapping/>
   </p:clrMapOvr>
-  <mc:AlternateContent xmlns:mc="http://schemas.openxmlformats.org/markup-compatibility/2006">
-    <mc:Choice xmlns:p14="http://schemas.microsoft.com/office/powerpoint/2010/main" Requires="p14">
+  <mc:AlternateContent xmlns:mc="http://schemas.openxmlformats.org/markup-compatibility/2006" xmlns:p14="http://schemas.microsoft.com/office/powerpoint/2010/main">
+    <mc:Choice Requires="p14">
       <p:transition spd="med" p14:dur="700">
         <p:fade/>
       </p:transition>
     </mc:Choice>
-    <mc:Fallback>
+    <mc:Fallback xmlns="">
       <p:transition spd="med">
         <p:fade/>
       </p:transition>
@@ -3091,13 +3101,13 @@
   <p:clrMapOvr>
     <a:masterClrMapping/>
   </p:clrMapOvr>
-  <mc:AlternateContent xmlns:mc="http://schemas.openxmlformats.org/markup-compatibility/2006">
-    <mc:Choice xmlns:p14="http://schemas.microsoft.com/office/powerpoint/2010/main" Requires="p14">
+  <mc:AlternateContent xmlns:mc="http://schemas.openxmlformats.org/markup-compatibility/2006" xmlns:p14="http://schemas.microsoft.com/office/powerpoint/2010/main">
+    <mc:Choice Requires="p14">
       <p:transition spd="med" p14:dur="700">
         <p:fade/>
       </p:transition>
     </mc:Choice>
-    <mc:Fallback>
+    <mc:Fallback xmlns="">
       <p:transition spd="med">
         <p:fade/>
       </p:transition>
@@ -3234,13 +3244,13 @@
   <p:clrMapOvr>
     <a:masterClrMapping/>
   </p:clrMapOvr>
-  <mc:AlternateContent xmlns:mc="http://schemas.openxmlformats.org/markup-compatibility/2006">
-    <mc:Choice xmlns:p14="http://schemas.microsoft.com/office/powerpoint/2010/main" Requires="p14">
+  <mc:AlternateContent xmlns:mc="http://schemas.openxmlformats.org/markup-compatibility/2006" xmlns:p14="http://schemas.microsoft.com/office/powerpoint/2010/main">
+    <mc:Choice Requires="p14">
       <p:transition spd="med" p14:dur="700">
         <p:fade/>
       </p:transition>
     </mc:Choice>
-    <mc:Fallback>
+    <mc:Fallback xmlns="">
       <p:transition spd="med">
         <p:fade/>
       </p:transition>
@@ -3381,13 +3391,13 @@
   <p:clrMapOvr>
     <a:masterClrMapping/>
   </p:clrMapOvr>
-  <mc:AlternateContent xmlns:mc="http://schemas.openxmlformats.org/markup-compatibility/2006">
-    <mc:Choice xmlns:p14="http://schemas.microsoft.com/office/powerpoint/2010/main" Requires="p14">
+  <mc:AlternateContent xmlns:mc="http://schemas.openxmlformats.org/markup-compatibility/2006" xmlns:p14="http://schemas.microsoft.com/office/powerpoint/2010/main">
+    <mc:Choice Requires="p14">
       <p:transition spd="med" p14:dur="700">
         <p:fade/>
       </p:transition>
     </mc:Choice>
-    <mc:Fallback>
+    <mc:Fallback xmlns="">
       <p:transition spd="med">
         <p:fade/>
       </p:transition>
@@ -3554,13 +3564,13 @@
   <p:clrMapOvr>
     <a:masterClrMapping/>
   </p:clrMapOvr>
-  <mc:AlternateContent xmlns:mc="http://schemas.openxmlformats.org/markup-compatibility/2006">
-    <mc:Choice xmlns:p14="http://schemas.microsoft.com/office/powerpoint/2010/main" Requires="p14">
+  <mc:AlternateContent xmlns:mc="http://schemas.openxmlformats.org/markup-compatibility/2006" xmlns:p14="http://schemas.microsoft.com/office/powerpoint/2010/main">
+    <mc:Choice Requires="p14">
       <p:transition spd="med" p14:dur="700">
         <p:fade/>
       </p:transition>
     </mc:Choice>
-    <mc:Fallback>
+    <mc:Fallback xmlns="">
       <p:transition spd="med">
         <p:fade/>
       </p:transition>
@@ -3656,13 +3666,13 @@
   <p:clrMapOvr>
     <a:masterClrMapping/>
   </p:clrMapOvr>
-  <mc:AlternateContent xmlns:mc="http://schemas.openxmlformats.org/markup-compatibility/2006">
-    <mc:Choice xmlns:p14="http://schemas.microsoft.com/office/powerpoint/2010/main" Requires="p14">
+  <mc:AlternateContent xmlns:mc="http://schemas.openxmlformats.org/markup-compatibility/2006" xmlns:p14="http://schemas.microsoft.com/office/powerpoint/2010/main">
+    <mc:Choice Requires="p14">
       <p:transition spd="med" p14:dur="700">
         <p:fade/>
       </p:transition>
     </mc:Choice>
-    <mc:Fallback>
+    <mc:Fallback xmlns="">
       <p:transition spd="med">
         <p:fade/>
       </p:transition>
@@ -3734,13 +3744,13 @@
   <p:clrMapOvr>
     <a:masterClrMapping/>
   </p:clrMapOvr>
-  <mc:AlternateContent xmlns:mc="http://schemas.openxmlformats.org/markup-compatibility/2006">
-    <mc:Choice xmlns:p14="http://schemas.microsoft.com/office/powerpoint/2010/main" Requires="p14">
+  <mc:AlternateContent xmlns:mc="http://schemas.openxmlformats.org/markup-compatibility/2006" xmlns:p14="http://schemas.microsoft.com/office/powerpoint/2010/main">
+    <mc:Choice Requires="p14">
       <p:transition spd="med" p14:dur="700">
         <p:fade/>
       </p:transition>
     </mc:Choice>
-    <mc:Fallback>
+    <mc:Fallback xmlns="">
       <p:transition spd="med">
         <p:fade/>
       </p:transition>
@@ -3919,13 +3929,13 @@
   <p:clrMapOvr>
     <a:masterClrMapping/>
   </p:clrMapOvr>
-  <mc:AlternateContent xmlns:mc="http://schemas.openxmlformats.org/markup-compatibility/2006">
-    <mc:Choice xmlns:p14="http://schemas.microsoft.com/office/powerpoint/2010/main" Requires="p14">
+  <mc:AlternateContent xmlns:mc="http://schemas.openxmlformats.org/markup-compatibility/2006" xmlns:p14="http://schemas.microsoft.com/office/powerpoint/2010/main">
+    <mc:Choice Requires="p14">
       <p:transition spd="med" p14:dur="700">
         <p:fade/>
       </p:transition>
     </mc:Choice>
-    <mc:Fallback>
+    <mc:Fallback xmlns="">
       <p:transition spd="med">
         <p:fade/>
       </p:transition>
@@ -4128,13 +4138,13 @@
   <p:clrMapOvr>
     <a:masterClrMapping/>
   </p:clrMapOvr>
-  <mc:AlternateContent xmlns:mc="http://schemas.openxmlformats.org/markup-compatibility/2006">
-    <mc:Choice xmlns:p14="http://schemas.microsoft.com/office/powerpoint/2010/main" Requires="p14">
+  <mc:AlternateContent xmlns:mc="http://schemas.openxmlformats.org/markup-compatibility/2006" xmlns:p14="http://schemas.microsoft.com/office/powerpoint/2010/main">
+    <mc:Choice Requires="p14">
       <p:transition spd="med" p14:dur="700">
         <p:fade/>
       </p:transition>
     </mc:Choice>
-    <mc:Fallback>
+    <mc:Fallback xmlns="">
       <p:transition spd="med">
         <p:fade/>
       </p:transition>
@@ -4304,13 +4314,13 @@
   <p:clrMapOvr>
     <a:masterClrMapping/>
   </p:clrMapOvr>
-  <mc:AlternateContent xmlns:mc="http://schemas.openxmlformats.org/markup-compatibility/2006">
-    <mc:Choice xmlns:p14="http://schemas.microsoft.com/office/powerpoint/2010/main" Requires="p14">
+  <mc:AlternateContent xmlns:mc="http://schemas.openxmlformats.org/markup-compatibility/2006" xmlns:p14="http://schemas.microsoft.com/office/powerpoint/2010/main">
+    <mc:Choice Requires="p14">
       <p:transition spd="med" p14:dur="700">
         <p:fade/>
       </p:transition>
     </mc:Choice>
-    <mc:Fallback>
+    <mc:Fallback xmlns="">
       <p:transition spd="med">
         <p:fade/>
       </p:transition>
@@ -4465,13 +4475,13 @@
   <p:clrMapOvr>
     <a:masterClrMapping/>
   </p:clrMapOvr>
-  <mc:AlternateContent xmlns:mc="http://schemas.openxmlformats.org/markup-compatibility/2006">
-    <mc:Choice xmlns:p14="http://schemas.microsoft.com/office/powerpoint/2010/main" Requires="p14">
+  <mc:AlternateContent xmlns:mc="http://schemas.openxmlformats.org/markup-compatibility/2006" xmlns:p14="http://schemas.microsoft.com/office/powerpoint/2010/main">
+    <mc:Choice Requires="p14">
       <p:transition spd="med" p14:dur="700">
         <p:fade/>
       </p:transition>
     </mc:Choice>
-    <mc:Fallback>
+    <mc:Fallback xmlns="">
       <p:transition spd="med">
         <p:fade/>
       </p:transition>
@@ -4912,13 +4922,13 @@
   <p:clrMapOvr>
     <a:masterClrMapping/>
   </p:clrMapOvr>
-  <mc:AlternateContent xmlns:mc="http://schemas.openxmlformats.org/markup-compatibility/2006">
-    <mc:Choice xmlns:p14="http://schemas.microsoft.com/office/powerpoint/2010/main" Requires="p14">
+  <mc:AlternateContent xmlns:mc="http://schemas.openxmlformats.org/markup-compatibility/2006" xmlns:p14="http://schemas.microsoft.com/office/powerpoint/2010/main">
+    <mc:Choice Requires="p14">
       <p:transition spd="med" p14:dur="700">
         <p:fade/>
       </p:transition>
     </mc:Choice>
-    <mc:Fallback>
+    <mc:Fallback xmlns="">
       <p:transition spd="med">
         <p:fade/>
       </p:transition>
@@ -5425,13 +5435,13 @@
   <p:clrMapOvr>
     <a:masterClrMapping/>
   </p:clrMapOvr>
-  <mc:AlternateContent xmlns:mc="http://schemas.openxmlformats.org/markup-compatibility/2006">
-    <mc:Choice xmlns:p14="http://schemas.microsoft.com/office/powerpoint/2010/main" Requires="p14">
+  <mc:AlternateContent xmlns:mc="http://schemas.openxmlformats.org/markup-compatibility/2006" xmlns:p14="http://schemas.microsoft.com/office/powerpoint/2010/main">
+    <mc:Choice Requires="p14">
       <p:transition spd="med" p14:dur="700">
         <p:fade/>
       </p:transition>
     </mc:Choice>
-    <mc:Fallback>
+    <mc:Fallback xmlns="">
       <p:transition spd="med">
         <p:fade/>
       </p:transition>

</xml_diff>

<commit_message>
Inserção do slide com o Big O
</commit_message>
<xml_diff>
--- a/Seminário - A Star/A Star.pptx
+++ b/Seminário - A Star/A Star.pptx
@@ -5,7 +5,7 @@
     <p:sldMasterId id="2147483648" r:id="rId1"/>
   </p:sldMasterIdLst>
   <p:notesMasterIdLst>
-    <p:notesMasterId r:id="rId16"/>
+    <p:notesMasterId r:id="rId17"/>
   </p:notesMasterIdLst>
   <p:sldIdLst>
     <p:sldId id="256" r:id="rId2"/>
@@ -13,15 +13,16 @@
     <p:sldId id="268" r:id="rId4"/>
     <p:sldId id="257" r:id="rId5"/>
     <p:sldId id="272" r:id="rId6"/>
-    <p:sldId id="259" r:id="rId7"/>
-    <p:sldId id="269" r:id="rId8"/>
-    <p:sldId id="260" r:id="rId9"/>
-    <p:sldId id="273" r:id="rId10"/>
-    <p:sldId id="274" r:id="rId11"/>
-    <p:sldId id="261" r:id="rId12"/>
-    <p:sldId id="270" r:id="rId13"/>
-    <p:sldId id="262" r:id="rId14"/>
-    <p:sldId id="266" r:id="rId15"/>
+    <p:sldId id="275" r:id="rId7"/>
+    <p:sldId id="259" r:id="rId8"/>
+    <p:sldId id="269" r:id="rId9"/>
+    <p:sldId id="260" r:id="rId10"/>
+    <p:sldId id="273" r:id="rId11"/>
+    <p:sldId id="274" r:id="rId12"/>
+    <p:sldId id="261" r:id="rId13"/>
+    <p:sldId id="270" r:id="rId14"/>
+    <p:sldId id="262" r:id="rId15"/>
+    <p:sldId id="266" r:id="rId16"/>
   </p:sldIdLst>
   <p:sldSz cx="13004800" cy="9753600"/>
   <p:notesSz cx="6858000" cy="9144000"/>
@@ -957,7 +958,7 @@
           </a:ln>
           <a:extLst>
             <a:ext uri="{C572A759-6A51-4108-AA02-DFA0A04FC94B}">
-              <ma14:wrappingTextBoxFlag xmlns="" xmlns:ma14="http://schemas.microsoft.com/office/mac/drawingml/2011/main" val="1"/>
+              <ma14:wrappingTextBoxFlag xmlns:ma14="http://schemas.microsoft.com/office/mac/drawingml/2011/main" xmlns="" val="1"/>
             </a:ext>
           </a:extLst>
         </p:spPr>
@@ -996,7 +997,7 @@
           </a:ln>
           <a:extLst>
             <a:ext uri="{C572A759-6A51-4108-AA02-DFA0A04FC94B}">
-              <ma14:wrappingTextBoxFlag xmlns="" xmlns:ma14="http://schemas.microsoft.com/office/mac/drawingml/2011/main" val="1"/>
+              <ma14:wrappingTextBoxFlag xmlns:ma14="http://schemas.microsoft.com/office/mac/drawingml/2011/main" xmlns="" val="1"/>
             </a:ext>
           </a:extLst>
         </p:spPr>
@@ -1986,7 +1987,7 @@
           </a:ln>
           <a:extLst>
             <a:ext uri="{C572A759-6A51-4108-AA02-DFA0A04FC94B}">
-              <ma14:wrappingTextBoxFlag xmlns="" xmlns:ma14="http://schemas.microsoft.com/office/mac/drawingml/2011/main" val="1"/>
+              <ma14:wrappingTextBoxFlag xmlns:ma14="http://schemas.microsoft.com/office/mac/drawingml/2011/main" xmlns="" val="1"/>
             </a:ext>
           </a:extLst>
         </p:spPr>
@@ -2032,7 +2033,7 @@
           </a:ln>
           <a:extLst>
             <a:ext uri="{C572A759-6A51-4108-AA02-DFA0A04FC94B}">
-              <ma14:wrappingTextBoxFlag xmlns="" xmlns:ma14="http://schemas.microsoft.com/office/mac/drawingml/2011/main" val="1"/>
+              <ma14:wrappingTextBoxFlag xmlns:ma14="http://schemas.microsoft.com/office/mac/drawingml/2011/main" xmlns="" val="1"/>
             </a:ext>
           </a:extLst>
         </p:spPr>
@@ -2262,6 +2263,519 @@
         <p:spPr>
           <a:xfrm>
             <a:off x="735792" y="1252331"/>
+            <a:ext cx="11708293" cy="8322365"/>
+          </a:xfrm>
+          <a:prstGeom prst="rect">
+            <a:avLst/>
+          </a:prstGeom>
+        </p:spPr>
+        <p:txBody>
+          <a:bodyPr>
+            <a:noAutofit/>
+          </a:bodyPr>
+          <a:lstStyle/>
+          <a:p>
+            <a:pPr marL="0" indent="0" defTabSz="543305">
+              <a:spcBef>
+                <a:spcPts val="100"/>
+              </a:spcBef>
+              <a:buNone/>
+              <a:defRPr sz="3348"/>
+            </a:pPr>
+            <a:r>
+              <a:rPr lang="en-US" sz="2400" dirty="0">
+                <a:latin typeface="Arial Narrow" panose="020B0606020202030204" pitchFamily="34" charset="0"/>
+              </a:rPr>
+              <a:t>    </a:t>
+            </a:r>
+            <a:r>
+              <a:rPr lang="en-US" sz="2800" dirty="0">
+                <a:highlight>
+                  <a:srgbClr val="C0C0C0"/>
+                </a:highlight>
+                <a:latin typeface="Arial Narrow" panose="020B0606020202030204" pitchFamily="34" charset="0"/>
+              </a:rPr>
+              <a:t>// For each node, which node it can most efficiently be reached from.</a:t>
+            </a:r>
+          </a:p>
+          <a:p>
+            <a:pPr marL="0" indent="0" defTabSz="543305">
+              <a:spcBef>
+                <a:spcPts val="100"/>
+              </a:spcBef>
+              <a:buNone/>
+              <a:defRPr sz="3348"/>
+            </a:pPr>
+            <a:r>
+              <a:rPr lang="en-US" sz="2800" dirty="0">
+                <a:latin typeface="Arial Narrow" panose="020B0606020202030204" pitchFamily="34" charset="0"/>
+              </a:rPr>
+              <a:t>    </a:t>
+            </a:r>
+            <a:r>
+              <a:rPr lang="en-US" sz="2800" dirty="0">
+                <a:highlight>
+                  <a:srgbClr val="C0C0C0"/>
+                </a:highlight>
+                <a:latin typeface="Arial Narrow" panose="020B0606020202030204" pitchFamily="34" charset="0"/>
+              </a:rPr>
+              <a:t>// If a node can be reached from many nodes, </a:t>
+            </a:r>
+            <a:r>
+              <a:rPr lang="en-US" sz="2800" dirty="0" err="1">
+                <a:highlight>
+                  <a:srgbClr val="C0C0C0"/>
+                </a:highlight>
+                <a:latin typeface="Arial Narrow" panose="020B0606020202030204" pitchFamily="34" charset="0"/>
+              </a:rPr>
+              <a:t>cameFrom</a:t>
+            </a:r>
+            <a:r>
+              <a:rPr lang="en-US" sz="2800" dirty="0">
+                <a:highlight>
+                  <a:srgbClr val="C0C0C0"/>
+                </a:highlight>
+                <a:latin typeface="Arial Narrow" panose="020B0606020202030204" pitchFamily="34" charset="0"/>
+              </a:rPr>
+              <a:t> will eventually contain the</a:t>
+            </a:r>
+          </a:p>
+          <a:p>
+            <a:pPr marL="0" indent="0" defTabSz="543305">
+              <a:spcBef>
+                <a:spcPts val="100"/>
+              </a:spcBef>
+              <a:buNone/>
+              <a:defRPr sz="3348"/>
+            </a:pPr>
+            <a:r>
+              <a:rPr lang="en-US" sz="2800" dirty="0">
+                <a:latin typeface="Arial Narrow" panose="020B0606020202030204" pitchFamily="34" charset="0"/>
+              </a:rPr>
+              <a:t>    </a:t>
+            </a:r>
+            <a:r>
+              <a:rPr lang="en-US" sz="2800" dirty="0">
+                <a:highlight>
+                  <a:srgbClr val="C0C0C0"/>
+                </a:highlight>
+                <a:latin typeface="Arial Narrow" panose="020B0606020202030204" pitchFamily="34" charset="0"/>
+              </a:rPr>
+              <a:t>// most efficient previous step.</a:t>
+            </a:r>
+          </a:p>
+          <a:p>
+            <a:pPr marL="0" indent="0" defTabSz="543305">
+              <a:spcBef>
+                <a:spcPts val="100"/>
+              </a:spcBef>
+              <a:buNone/>
+              <a:defRPr sz="3348"/>
+            </a:pPr>
+            <a:r>
+              <a:rPr lang="en-US" sz="2800" dirty="0">
+                <a:latin typeface="Arial Narrow" panose="020B0606020202030204" pitchFamily="34" charset="0"/>
+              </a:rPr>
+              <a:t>    </a:t>
+            </a:r>
+            <a:r>
+              <a:rPr lang="en-US" sz="2800" b="1" dirty="0" err="1">
+                <a:latin typeface="Arial Narrow" panose="020B0606020202030204" pitchFamily="34" charset="0"/>
+              </a:rPr>
+              <a:t>cameFrom</a:t>
+            </a:r>
+            <a:r>
+              <a:rPr lang="en-US" sz="2800" b="1" dirty="0">
+                <a:latin typeface="Arial Narrow" panose="020B0606020202030204" pitchFamily="34" charset="0"/>
+              </a:rPr>
+              <a:t> := an empty map</a:t>
+            </a:r>
+          </a:p>
+          <a:p>
+            <a:pPr marL="0" indent="0" defTabSz="543305">
+              <a:spcBef>
+                <a:spcPts val="100"/>
+              </a:spcBef>
+              <a:buNone/>
+              <a:defRPr sz="3348"/>
+            </a:pPr>
+            <a:endParaRPr lang="en-US" sz="2800" dirty="0">
+              <a:latin typeface="Arial Narrow" panose="020B0606020202030204" pitchFamily="34" charset="0"/>
+            </a:endParaRPr>
+          </a:p>
+          <a:p>
+            <a:pPr marL="0" indent="0" defTabSz="543305">
+              <a:spcBef>
+                <a:spcPts val="100"/>
+              </a:spcBef>
+              <a:buNone/>
+              <a:defRPr sz="3348"/>
+            </a:pPr>
+            <a:r>
+              <a:rPr lang="en-US" sz="2800" dirty="0">
+                <a:latin typeface="Arial Narrow" panose="020B0606020202030204" pitchFamily="34" charset="0"/>
+              </a:rPr>
+              <a:t>    </a:t>
+            </a:r>
+            <a:r>
+              <a:rPr lang="en-US" sz="2800" dirty="0">
+                <a:highlight>
+                  <a:srgbClr val="C0C0C0"/>
+                </a:highlight>
+                <a:latin typeface="Arial Narrow" panose="020B0606020202030204" pitchFamily="34" charset="0"/>
+              </a:rPr>
+              <a:t>// For each node, the cost of getting from the start node to that node.</a:t>
+            </a:r>
+          </a:p>
+          <a:p>
+            <a:pPr marL="0" indent="0" defTabSz="543305">
+              <a:spcBef>
+                <a:spcPts val="100"/>
+              </a:spcBef>
+              <a:buNone/>
+              <a:defRPr sz="3348"/>
+            </a:pPr>
+            <a:r>
+              <a:rPr lang="en-US" sz="2800" dirty="0">
+                <a:latin typeface="Arial Narrow" panose="020B0606020202030204" pitchFamily="34" charset="0"/>
+              </a:rPr>
+              <a:t>    </a:t>
+            </a:r>
+            <a:r>
+              <a:rPr lang="en-US" sz="2800" b="1" dirty="0" err="1">
+                <a:latin typeface="Arial Narrow" panose="020B0606020202030204" pitchFamily="34" charset="0"/>
+              </a:rPr>
+              <a:t>gScore</a:t>
+            </a:r>
+            <a:r>
+              <a:rPr lang="en-US" sz="2800" b="1" dirty="0">
+                <a:latin typeface="Arial Narrow" panose="020B0606020202030204" pitchFamily="34" charset="0"/>
+              </a:rPr>
+              <a:t> := map with default value of Infinity</a:t>
+            </a:r>
+          </a:p>
+          <a:p>
+            <a:pPr marL="0" indent="0" defTabSz="543305">
+              <a:spcBef>
+                <a:spcPts val="100"/>
+              </a:spcBef>
+              <a:buNone/>
+              <a:defRPr sz="3348"/>
+            </a:pPr>
+            <a:endParaRPr lang="en-US" sz="2800" dirty="0">
+              <a:latin typeface="Arial Narrow" panose="020B0606020202030204" pitchFamily="34" charset="0"/>
+            </a:endParaRPr>
+          </a:p>
+          <a:p>
+            <a:pPr marL="0" indent="0" defTabSz="543305">
+              <a:spcBef>
+                <a:spcPts val="100"/>
+              </a:spcBef>
+              <a:buNone/>
+              <a:defRPr sz="3348"/>
+            </a:pPr>
+            <a:r>
+              <a:rPr lang="en-US" sz="2800" dirty="0">
+                <a:latin typeface="Arial Narrow" panose="020B0606020202030204" pitchFamily="34" charset="0"/>
+              </a:rPr>
+              <a:t>    </a:t>
+            </a:r>
+            <a:r>
+              <a:rPr lang="en-US" sz="2800" dirty="0">
+                <a:highlight>
+                  <a:srgbClr val="C0C0C0"/>
+                </a:highlight>
+                <a:latin typeface="Arial Narrow" panose="020B0606020202030204" pitchFamily="34" charset="0"/>
+              </a:rPr>
+              <a:t>// The cost of going from start to start is zero.</a:t>
+            </a:r>
+          </a:p>
+          <a:p>
+            <a:pPr marL="0" indent="0" defTabSz="543305">
+              <a:spcBef>
+                <a:spcPts val="100"/>
+              </a:spcBef>
+              <a:buNone/>
+              <a:defRPr sz="3348"/>
+            </a:pPr>
+            <a:r>
+              <a:rPr lang="en-US" sz="2800" dirty="0">
+                <a:latin typeface="Arial Narrow" panose="020B0606020202030204" pitchFamily="34" charset="0"/>
+              </a:rPr>
+              <a:t>    </a:t>
+            </a:r>
+            <a:r>
+              <a:rPr lang="en-US" sz="2800" b="1" dirty="0" err="1">
+                <a:latin typeface="Arial Narrow" panose="020B0606020202030204" pitchFamily="34" charset="0"/>
+              </a:rPr>
+              <a:t>gScore</a:t>
+            </a:r>
+            <a:r>
+              <a:rPr lang="en-US" sz="2800" b="1" dirty="0">
+                <a:latin typeface="Arial Narrow" panose="020B0606020202030204" pitchFamily="34" charset="0"/>
+              </a:rPr>
+              <a:t>[start] := 0</a:t>
+            </a:r>
+          </a:p>
+          <a:p>
+            <a:pPr marL="0" indent="0" defTabSz="543305">
+              <a:spcBef>
+                <a:spcPts val="100"/>
+              </a:spcBef>
+              <a:buNone/>
+              <a:defRPr sz="3348"/>
+            </a:pPr>
+            <a:endParaRPr lang="en-US" sz="2800" dirty="0">
+              <a:latin typeface="Arial Narrow" panose="020B0606020202030204" pitchFamily="34" charset="0"/>
+            </a:endParaRPr>
+          </a:p>
+          <a:p>
+            <a:pPr marL="0" indent="0" defTabSz="543305">
+              <a:spcBef>
+                <a:spcPts val="100"/>
+              </a:spcBef>
+              <a:buNone/>
+              <a:defRPr sz="3348"/>
+            </a:pPr>
+            <a:r>
+              <a:rPr lang="en-US" sz="2800" dirty="0">
+                <a:latin typeface="Arial Narrow" panose="020B0606020202030204" pitchFamily="34" charset="0"/>
+              </a:rPr>
+              <a:t>    </a:t>
+            </a:r>
+            <a:r>
+              <a:rPr lang="en-US" sz="2800" dirty="0">
+                <a:highlight>
+                  <a:srgbClr val="C0C0C0"/>
+                </a:highlight>
+                <a:latin typeface="Arial Narrow" panose="020B0606020202030204" pitchFamily="34" charset="0"/>
+              </a:rPr>
+              <a:t>// For each node, the total cost of getting from the start node to the goal</a:t>
+            </a:r>
+          </a:p>
+          <a:p>
+            <a:pPr marL="0" indent="0" defTabSz="543305">
+              <a:spcBef>
+                <a:spcPts val="100"/>
+              </a:spcBef>
+              <a:buNone/>
+              <a:defRPr sz="3348"/>
+            </a:pPr>
+            <a:r>
+              <a:rPr lang="en-US" sz="2800" dirty="0">
+                <a:latin typeface="Arial Narrow" panose="020B0606020202030204" pitchFamily="34" charset="0"/>
+              </a:rPr>
+              <a:t>    </a:t>
+            </a:r>
+            <a:r>
+              <a:rPr lang="en-US" sz="2800" dirty="0">
+                <a:highlight>
+                  <a:srgbClr val="C0C0C0"/>
+                </a:highlight>
+                <a:latin typeface="Arial Narrow" panose="020B0606020202030204" pitchFamily="34" charset="0"/>
+              </a:rPr>
+              <a:t>// by passing by that node. That value is partly known, partly heuristic.</a:t>
+            </a:r>
+          </a:p>
+          <a:p>
+            <a:pPr marL="0" indent="0" defTabSz="543305">
+              <a:spcBef>
+                <a:spcPts val="100"/>
+              </a:spcBef>
+              <a:buNone/>
+              <a:defRPr sz="3348"/>
+            </a:pPr>
+            <a:r>
+              <a:rPr lang="en-US" sz="2800" dirty="0">
+                <a:latin typeface="Arial Narrow" panose="020B0606020202030204" pitchFamily="34" charset="0"/>
+              </a:rPr>
+              <a:t>   </a:t>
+            </a:r>
+            <a:r>
+              <a:rPr lang="en-US" sz="2800" b="1" dirty="0">
+                <a:latin typeface="Arial Narrow" panose="020B0606020202030204" pitchFamily="34" charset="0"/>
+              </a:rPr>
+              <a:t> </a:t>
+            </a:r>
+            <a:r>
+              <a:rPr lang="en-US" sz="2800" b="1" dirty="0" err="1">
+                <a:latin typeface="Arial Narrow" panose="020B0606020202030204" pitchFamily="34" charset="0"/>
+              </a:rPr>
+              <a:t>fScore</a:t>
+            </a:r>
+            <a:r>
+              <a:rPr lang="en-US" sz="2800" b="1" dirty="0">
+                <a:latin typeface="Arial Narrow" panose="020B0606020202030204" pitchFamily="34" charset="0"/>
+              </a:rPr>
+              <a:t> := map with default value of Infinity</a:t>
+            </a:r>
+          </a:p>
+          <a:p>
+            <a:pPr marL="0" indent="0" defTabSz="543305">
+              <a:spcBef>
+                <a:spcPts val="100"/>
+              </a:spcBef>
+              <a:buNone/>
+              <a:defRPr sz="3348"/>
+            </a:pPr>
+            <a:endParaRPr lang="en-US" sz="2800" dirty="0">
+              <a:latin typeface="Arial Narrow" panose="020B0606020202030204" pitchFamily="34" charset="0"/>
+            </a:endParaRPr>
+          </a:p>
+          <a:p>
+            <a:pPr marL="0" indent="0" defTabSz="543305">
+              <a:spcBef>
+                <a:spcPts val="100"/>
+              </a:spcBef>
+              <a:buNone/>
+              <a:defRPr sz="3348"/>
+            </a:pPr>
+            <a:r>
+              <a:rPr lang="en-US" sz="2800" dirty="0">
+                <a:latin typeface="Arial Narrow" panose="020B0606020202030204" pitchFamily="34" charset="0"/>
+              </a:rPr>
+              <a:t>    </a:t>
+            </a:r>
+            <a:r>
+              <a:rPr lang="en-US" sz="2800" dirty="0">
+                <a:highlight>
+                  <a:srgbClr val="C0C0C0"/>
+                </a:highlight>
+                <a:latin typeface="Arial Narrow" panose="020B0606020202030204" pitchFamily="34" charset="0"/>
+              </a:rPr>
+              <a:t>// For the first node, that value is completely heuristic.</a:t>
+            </a:r>
+          </a:p>
+          <a:p>
+            <a:pPr marL="0" indent="0" defTabSz="543305">
+              <a:spcBef>
+                <a:spcPts val="100"/>
+              </a:spcBef>
+              <a:buNone/>
+              <a:defRPr sz="3348"/>
+            </a:pPr>
+            <a:r>
+              <a:rPr lang="en-US" sz="2800" dirty="0">
+                <a:latin typeface="Arial Narrow" panose="020B0606020202030204" pitchFamily="34" charset="0"/>
+              </a:rPr>
+              <a:t>    </a:t>
+            </a:r>
+            <a:r>
+              <a:rPr lang="en-US" sz="2800" b="1" dirty="0" err="1">
+                <a:latin typeface="Arial Narrow" panose="020B0606020202030204" pitchFamily="34" charset="0"/>
+              </a:rPr>
+              <a:t>fScore</a:t>
+            </a:r>
+            <a:r>
+              <a:rPr lang="en-US" sz="2800" b="1" dirty="0">
+                <a:latin typeface="Arial Narrow" panose="020B0606020202030204" pitchFamily="34" charset="0"/>
+              </a:rPr>
+              <a:t>[start] := </a:t>
+            </a:r>
+            <a:r>
+              <a:rPr lang="en-US" sz="2800" b="1" dirty="0" err="1">
+                <a:latin typeface="Arial Narrow" panose="020B0606020202030204" pitchFamily="34" charset="0"/>
+              </a:rPr>
+              <a:t>heuristic_cost_estimate</a:t>
+            </a:r>
+            <a:r>
+              <a:rPr lang="en-US" sz="2800" b="1" dirty="0">
+                <a:latin typeface="Arial Narrow" panose="020B0606020202030204" pitchFamily="34" charset="0"/>
+              </a:rPr>
+              <a:t>(start, goal)</a:t>
+            </a:r>
+          </a:p>
+        </p:txBody>
+      </p:sp>
+    </p:spTree>
+    <p:extLst>
+      <p:ext uri="{BB962C8B-B14F-4D97-AF65-F5344CB8AC3E}">
+        <p14:creationId xmlns:p14="http://schemas.microsoft.com/office/powerpoint/2010/main" val="2168827275"/>
+      </p:ext>
+    </p:extLst>
+  </p:cSld>
+  <p:clrMapOvr>
+    <a:masterClrMapping/>
+  </p:clrMapOvr>
+  <mc:AlternateContent xmlns:mc="http://schemas.openxmlformats.org/markup-compatibility/2006" xmlns:p14="http://schemas.microsoft.com/office/powerpoint/2010/main">
+    <mc:Choice Requires="p14">
+      <p:transition spd="med" p14:dur="700">
+        <p:fade/>
+      </p:transition>
+    </mc:Choice>
+    <mc:Fallback xmlns="">
+      <p:transition spd="med">
+        <p:fade/>
+      </p:transition>
+    </mc:Fallback>
+  </mc:AlternateContent>
+</p:sld>
+</file>
+
+<file path=ppt/slides/slide11.xml><?xml version="1.0" encoding="utf-8"?>
+<p:sld xmlns:a="http://schemas.openxmlformats.org/drawingml/2006/main" xmlns:r="http://schemas.openxmlformats.org/officeDocument/2006/relationships" xmlns:p="http://schemas.openxmlformats.org/presentationml/2006/main">
+  <p:cSld>
+    <p:spTree>
+      <p:nvGrpSpPr>
+        <p:cNvPr id="1" name=""/>
+        <p:cNvGrpSpPr/>
+        <p:nvPr/>
+      </p:nvGrpSpPr>
+      <p:grpSpPr>
+        <a:xfrm>
+          <a:off x="0" y="0"/>
+          <a:ext cx="0" cy="0"/>
+          <a:chOff x="0" y="0"/>
+          <a:chExt cx="0" cy="0"/>
+        </a:xfrm>
+      </p:grpSpPr>
+      <p:sp>
+        <p:nvSpPr>
+          <p:cNvPr id="71" name="Shape 71"/>
+          <p:cNvSpPr>
+            <a:spLocks noGrp="1"/>
+          </p:cNvSpPr>
+          <p:nvPr>
+            <p:ph type="title"/>
+          </p:nvPr>
+        </p:nvSpPr>
+        <p:spPr>
+          <a:xfrm>
+            <a:off x="560715" y="178904"/>
+            <a:ext cx="11883370" cy="1074994"/>
+          </a:xfrm>
+          <a:prstGeom prst="rect">
+            <a:avLst/>
+          </a:prstGeom>
+        </p:spPr>
+        <p:txBody>
+          <a:bodyPr>
+            <a:normAutofit/>
+          </a:bodyPr>
+          <a:lstStyle/>
+          <a:p>
+            <a:r>
+              <a:rPr sz="5400" dirty="0">
+                <a:latin typeface="Arial Narrow" panose="020B0606020202030204" pitchFamily="34" charset="0"/>
+              </a:rPr>
+              <a:t>Código</a:t>
+            </a:r>
+          </a:p>
+        </p:txBody>
+      </p:sp>
+      <p:sp>
+        <p:nvSpPr>
+          <p:cNvPr id="72" name="Shape 72"/>
+          <p:cNvSpPr>
+            <a:spLocks noGrp="1"/>
+          </p:cNvSpPr>
+          <p:nvPr>
+            <p:ph type="body" idx="1"/>
+          </p:nvPr>
+        </p:nvSpPr>
+        <p:spPr>
+          <a:xfrm>
+            <a:off x="735792" y="1252331"/>
             <a:ext cx="11708293" cy="8169965"/>
           </a:xfrm>
           <a:prstGeom prst="rect">
@@ -2960,7 +3474,7 @@
 </p:sld>
 </file>
 
-<file path=ppt/slides/slide11.xml><?xml version="1.0" encoding="utf-8"?>
+<file path=ppt/slides/slide12.xml><?xml version="1.0" encoding="utf-8"?>
 <p:sld xmlns:a="http://schemas.openxmlformats.org/drawingml/2006/main" xmlns:r="http://schemas.openxmlformats.org/officeDocument/2006/relationships" xmlns:p="http://schemas.openxmlformats.org/presentationml/2006/main">
   <p:cSld>
     <p:spTree>
@@ -3116,7 +3630,7 @@
 </p:sld>
 </file>
 
-<file path=ppt/slides/slide12.xml><?xml version="1.0" encoding="utf-8"?>
+<file path=ppt/slides/slide13.xml><?xml version="1.0" encoding="utf-8"?>
 <p:sld xmlns:a="http://schemas.openxmlformats.org/drawingml/2006/main" xmlns:r="http://schemas.openxmlformats.org/officeDocument/2006/relationships" xmlns:p="http://schemas.openxmlformats.org/presentationml/2006/main">
   <p:cSld>
     <p:spTree>
@@ -3259,7 +3773,7 @@
 </p:sld>
 </file>
 
-<file path=ppt/slides/slide13.xml><?xml version="1.0" encoding="utf-8"?>
+<file path=ppt/slides/slide14.xml><?xml version="1.0" encoding="utf-8"?>
 <p:sld xmlns:a="http://schemas.openxmlformats.org/drawingml/2006/main" xmlns:r="http://schemas.openxmlformats.org/officeDocument/2006/relationships" xmlns:p="http://schemas.openxmlformats.org/presentationml/2006/main">
   <p:cSld>
     <p:spTree>
@@ -3406,7 +3920,7 @@
 </p:sld>
 </file>
 
-<file path=ppt/slides/slide14.xml><?xml version="1.0" encoding="utf-8"?>
+<file path=ppt/slides/slide15.xml><?xml version="1.0" encoding="utf-8"?>
 <p:sld xmlns:a="http://schemas.openxmlformats.org/drawingml/2006/main" xmlns:r="http://schemas.openxmlformats.org/officeDocument/2006/relationships" xmlns:p="http://schemas.openxmlformats.org/presentationml/2006/main">
   <p:cSld>
     <p:spTree>
@@ -3822,7 +4336,7 @@
         <p:spPr>
           <a:xfrm>
             <a:off x="735791" y="1838632"/>
-            <a:ext cx="11339515" cy="6331334"/>
+            <a:ext cx="11339515" cy="6887926"/>
           </a:xfrm>
           <a:prstGeom prst="rect">
             <a:avLst/>
@@ -3918,9 +4432,6 @@
               </a:rPr>
               <a:t>.</a:t>
             </a:r>
-            <a:endParaRPr sz="4000" dirty="0">
-              <a:latin typeface="Arial Narrow" panose="020B0606020202030204" pitchFamily="34" charset="0"/>
-            </a:endParaRPr>
           </a:p>
         </p:txBody>
       </p:sp>
@@ -4172,6 +4683,309 @@
       </p:grpSpPr>
       <p:sp>
         <p:nvSpPr>
+          <p:cNvPr id="62" name="Shape 62"/>
+          <p:cNvSpPr>
+            <a:spLocks noGrp="1"/>
+          </p:cNvSpPr>
+          <p:nvPr>
+            <p:ph type="title"/>
+          </p:nvPr>
+        </p:nvSpPr>
+        <p:spPr>
+          <a:prstGeom prst="rect">
+            <a:avLst/>
+          </a:prstGeom>
+        </p:spPr>
+        <p:txBody>
+          <a:bodyPr>
+            <a:normAutofit/>
+          </a:bodyPr>
+          <a:lstStyle/>
+          <a:p>
+            <a:r>
+              <a:rPr lang="pt-BR" sz="5400" dirty="0">
+                <a:latin typeface="Arial Narrow" panose="020B0606020202030204" pitchFamily="34" charset="0"/>
+              </a:rPr>
+              <a:t>A*</a:t>
+            </a:r>
+            <a:endParaRPr sz="5400" dirty="0">
+              <a:latin typeface="Arial Narrow" panose="020B0606020202030204" pitchFamily="34" charset="0"/>
+            </a:endParaRPr>
+          </a:p>
+        </p:txBody>
+      </p:sp>
+      <mc:AlternateContent xmlns:mc="http://schemas.openxmlformats.org/markup-compatibility/2006">
+        <mc:Choice xmlns:a14="http://schemas.microsoft.com/office/drawing/2010/main" Requires="a14">
+          <p:sp>
+            <p:nvSpPr>
+              <p:cNvPr id="63" name="Shape 63"/>
+              <p:cNvSpPr>
+                <a:spLocks noGrp="1"/>
+              </p:cNvSpPr>
+              <p:nvPr>
+                <p:ph type="body" idx="1"/>
+              </p:nvPr>
+            </p:nvSpPr>
+            <p:spPr>
+              <a:xfrm>
+                <a:off x="735791" y="1838631"/>
+                <a:ext cx="11339515" cy="7066829"/>
+              </a:xfrm>
+              <a:prstGeom prst="rect">
+                <a:avLst/>
+              </a:prstGeom>
+            </p:spPr>
+            <p:txBody>
+              <a:bodyPr>
+                <a:noAutofit/>
+              </a:bodyPr>
+              <a:lstStyle/>
+              <a:p>
+                <a:pPr algn="just"/>
+                <a:r>
+                  <a:rPr lang="pt-BR" dirty="0">
+                    <a:latin typeface="Arial Narrow" panose="020B0606020202030204" pitchFamily="34" charset="0"/>
+                  </a:rPr>
+                  <a:t>Se o algoritmo for aplicado em uma árvore binária, o Big O de A* é O(log h*(x)), onde </a:t>
+                </a:r>
+                <a:r>
+                  <a:rPr lang="pt-BR" b="1" i="1" dirty="0">
+                    <a:latin typeface="Arial Narrow" panose="020B0606020202030204" pitchFamily="34" charset="0"/>
+                  </a:rPr>
+                  <a:t>h*</a:t>
+                </a:r>
+                <a:r>
+                  <a:rPr lang="pt-BR" i="1" dirty="0">
+                    <a:latin typeface="Arial Narrow" panose="020B0606020202030204" pitchFamily="34" charset="0"/>
+                  </a:rPr>
+                  <a:t> </a:t>
+                </a:r>
+                <a:r>
+                  <a:rPr lang="pt-BR" dirty="0">
+                    <a:latin typeface="Arial Narrow" panose="020B0606020202030204" pitchFamily="34" charset="0"/>
+                  </a:rPr>
+                  <a:t>é a função heurística ótima, dando a distância exata de </a:t>
+                </a:r>
+                <a:r>
+                  <a:rPr lang="pt-BR" b="1" i="1" dirty="0">
+                    <a:latin typeface="Arial Narrow" panose="020B0606020202030204" pitchFamily="34" charset="0"/>
+                  </a:rPr>
+                  <a:t>x</a:t>
+                </a:r>
+                <a:r>
+                  <a:rPr lang="pt-BR" dirty="0">
+                    <a:latin typeface="Arial Narrow" panose="020B0606020202030204" pitchFamily="34" charset="0"/>
+                  </a:rPr>
+                  <a:t> até o objetivo.</a:t>
+                </a:r>
+              </a:p>
+              <a:p>
+                <a:pPr algn="just"/>
+                <a:endParaRPr lang="pt-BR" sz="2000" i="1" dirty="0">
+                  <a:latin typeface="Arial Narrow" panose="020B0606020202030204" pitchFamily="34" charset="0"/>
+                </a:endParaRPr>
+              </a:p>
+              <a:p>
+                <a:pPr algn="just"/>
+                <a:r>
+                  <a:rPr lang="pt-BR" dirty="0">
+                    <a:latin typeface="Arial Narrow" panose="020B0606020202030204" pitchFamily="34" charset="0"/>
+                  </a:rPr>
+                  <a:t>Se o algoritmo for aplicado em um grafo, o Big O será dado por O(</a:t>
+                </a:r>
+                <a14:m>
+                  <m:oMath xmlns:m="http://schemas.openxmlformats.org/officeDocument/2006/math">
+                    <m:sSup>
+                      <m:sSupPr>
+                        <m:ctrlPr>
+                          <a:rPr lang="pt-BR" i="1" dirty="0" smtClean="0">
+                            <a:latin typeface="Cambria Math" panose="02040503050406030204" pitchFamily="18" charset="0"/>
+                          </a:rPr>
+                        </m:ctrlPr>
+                      </m:sSupPr>
+                      <m:e>
+                        <m:r>
+                          <a:rPr lang="pt-BR" b="0" i="1" dirty="0" smtClean="0">
+                            <a:latin typeface="Cambria Math" panose="02040503050406030204" pitchFamily="18" charset="0"/>
+                          </a:rPr>
+                          <m:t>𝑏</m:t>
+                        </m:r>
+                      </m:e>
+                      <m:sup>
+                        <m:r>
+                          <a:rPr lang="pt-BR" b="0" i="1" dirty="0" smtClean="0">
+                            <a:latin typeface="Cambria Math" panose="02040503050406030204" pitchFamily="18" charset="0"/>
+                          </a:rPr>
+                          <m:t>∗ </m:t>
+                        </m:r>
+                        <m:r>
+                          <a:rPr lang="pt-BR" b="0" i="1" dirty="0" smtClean="0">
+                            <a:latin typeface="Cambria Math" panose="02040503050406030204" pitchFamily="18" charset="0"/>
+                          </a:rPr>
+                          <m:t>𝑑</m:t>
+                        </m:r>
+                      </m:sup>
+                    </m:sSup>
+                  </m:oMath>
+                </a14:m>
+                <a:r>
+                  <a:rPr lang="pt-BR" dirty="0">
+                    <a:latin typeface="Arial Narrow" panose="020B0606020202030204" pitchFamily="34" charset="0"/>
+                  </a:rPr>
+                  <a:t>), onde </a:t>
+                </a:r>
+                <a:r>
+                  <a:rPr lang="pt-BR" b="1" i="1" dirty="0">
+                    <a:latin typeface="Arial Narrow" panose="020B0606020202030204" pitchFamily="34" charset="0"/>
+                  </a:rPr>
+                  <a:t>b* </a:t>
+                </a:r>
+                <a:r>
+                  <a:rPr lang="pt-BR" dirty="0">
+                    <a:latin typeface="Arial Narrow" panose="020B0606020202030204" pitchFamily="34" charset="0"/>
+                  </a:rPr>
+                  <a:t>é o </a:t>
+                </a:r>
+                <a:r>
+                  <a:rPr lang="pt-BR" i="1" dirty="0" err="1">
+                    <a:latin typeface="Arial Narrow" panose="020B0606020202030204" pitchFamily="34" charset="0"/>
+                  </a:rPr>
+                  <a:t>branching</a:t>
+                </a:r>
+                <a:r>
+                  <a:rPr lang="pt-BR" i="1" dirty="0">
+                    <a:latin typeface="Arial Narrow" panose="020B0606020202030204" pitchFamily="34" charset="0"/>
+                  </a:rPr>
+                  <a:t> </a:t>
+                </a:r>
+                <a:r>
+                  <a:rPr lang="pt-BR" i="1" dirty="0" err="1">
+                    <a:latin typeface="Arial Narrow" panose="020B0606020202030204" pitchFamily="34" charset="0"/>
+                  </a:rPr>
+                  <a:t>factor</a:t>
+                </a:r>
+                <a:r>
+                  <a:rPr lang="pt-BR" dirty="0">
+                    <a:latin typeface="Arial Narrow" panose="020B0606020202030204" pitchFamily="34" charset="0"/>
+                  </a:rPr>
+                  <a:t> (quantidade de filhos de cada nó) do grafo, e </a:t>
+                </a:r>
+                <a:r>
+                  <a:rPr lang="pt-BR" b="1" i="1" dirty="0">
+                    <a:latin typeface="Arial Narrow" panose="020B0606020202030204" pitchFamily="34" charset="0"/>
+                  </a:rPr>
+                  <a:t>d </a:t>
+                </a:r>
+                <a:r>
+                  <a:rPr lang="pt-BR" dirty="0">
+                    <a:latin typeface="Arial Narrow" panose="020B0606020202030204" pitchFamily="34" charset="0"/>
+                  </a:rPr>
+                  <a:t>é a profundidade desse grafo. O melhor caso será quando </a:t>
+                </a:r>
+                <a:r>
+                  <a:rPr lang="pt-BR" b="1" dirty="0">
+                    <a:latin typeface="Arial Narrow" panose="020B0606020202030204" pitchFamily="34" charset="0"/>
+                  </a:rPr>
+                  <a:t>b* = 1</a:t>
+                </a:r>
+                <a:r>
+                  <a:rPr lang="pt-BR" dirty="0">
+                    <a:latin typeface="Arial Narrow" panose="020B0606020202030204" pitchFamily="34" charset="0"/>
+                  </a:rPr>
+                  <a:t>.</a:t>
+                </a:r>
+                <a:endParaRPr lang="pt-BR" b="1" i="1" dirty="0">
+                  <a:latin typeface="Arial Narrow" panose="020B0606020202030204" pitchFamily="34" charset="0"/>
+                </a:endParaRPr>
+              </a:p>
+            </p:txBody>
+          </p:sp>
+        </mc:Choice>
+        <mc:Fallback>
+          <p:sp>
+            <p:nvSpPr>
+              <p:cNvPr id="63" name="Shape 63"/>
+              <p:cNvSpPr>
+                <a:spLocks noGrp="1" noRot="1" noChangeAspect="1" noMove="1" noResize="1" noEditPoints="1" noAdjustHandles="1" noChangeArrowheads="1" noChangeShapeType="1" noTextEdit="1"/>
+              </p:cNvSpPr>
+              <p:nvPr>
+                <p:ph type="body" idx="1"/>
+              </p:nvPr>
+            </p:nvSpPr>
+            <p:spPr>
+              <a:xfrm>
+                <a:off x="735791" y="1838631"/>
+                <a:ext cx="11339515" cy="7066829"/>
+              </a:xfrm>
+              <a:prstGeom prst="rect">
+                <a:avLst/>
+              </a:prstGeom>
+              <a:blipFill>
+                <a:blip r:embed="rId2"/>
+                <a:stretch>
+                  <a:fillRect l="-1290" t="-1294" r="-1989"/>
+                </a:stretch>
+              </a:blipFill>
+            </p:spPr>
+            <p:txBody>
+              <a:bodyPr/>
+              <a:lstStyle/>
+              <a:p>
+                <a:r>
+                  <a:rPr lang="pt-BR">
+                    <a:noFill/>
+                  </a:rPr>
+                  <a:t> </a:t>
+                </a:r>
+              </a:p>
+            </p:txBody>
+          </p:sp>
+        </mc:Fallback>
+      </mc:AlternateContent>
+    </p:spTree>
+    <p:extLst>
+      <p:ext uri="{BB962C8B-B14F-4D97-AF65-F5344CB8AC3E}">
+        <p14:creationId xmlns:p14="http://schemas.microsoft.com/office/powerpoint/2010/main" val="2147745343"/>
+      </p:ext>
+    </p:extLst>
+  </p:cSld>
+  <p:clrMapOvr>
+    <a:masterClrMapping/>
+  </p:clrMapOvr>
+  <mc:AlternateContent xmlns:mc="http://schemas.openxmlformats.org/markup-compatibility/2006" xmlns:p14="http://schemas.microsoft.com/office/powerpoint/2010/main">
+    <mc:Choice Requires="p14">
+      <p:transition spd="med" p14:dur="700">
+        <p:fade/>
+      </p:transition>
+    </mc:Choice>
+    <mc:Fallback xmlns="">
+      <p:transition spd="med">
+        <p:fade/>
+      </p:transition>
+    </mc:Fallback>
+  </mc:AlternateContent>
+</p:sld>
+</file>
+
+<file path=ppt/slides/slide7.xml><?xml version="1.0" encoding="utf-8"?>
+<p:sld xmlns:a="http://schemas.openxmlformats.org/drawingml/2006/main" xmlns:r="http://schemas.openxmlformats.org/officeDocument/2006/relationships" xmlns:p="http://schemas.openxmlformats.org/presentationml/2006/main">
+  <p:cSld>
+    <p:spTree>
+      <p:nvGrpSpPr>
+        <p:cNvPr id="1" name=""/>
+        <p:cNvGrpSpPr/>
+        <p:nvPr/>
+      </p:nvGrpSpPr>
+      <p:grpSpPr>
+        <a:xfrm>
+          <a:off x="0" y="0"/>
+          <a:ext cx="0" cy="0"/>
+          <a:chOff x="0" y="0"/>
+          <a:chExt cx="0" cy="0"/>
+        </a:xfrm>
+      </p:grpSpPr>
+      <p:sp>
+        <p:nvSpPr>
           <p:cNvPr id="68" name="Shape 68"/>
           <p:cNvSpPr>
             <a:spLocks noGrp="1"/>
@@ -4329,7 +5143,7 @@
 </p:sld>
 </file>
 
-<file path=ppt/slides/slide7.xml><?xml version="1.0" encoding="utf-8"?>
+<file path=ppt/slides/slide8.xml><?xml version="1.0" encoding="utf-8"?>
 <p:sld xmlns:a="http://schemas.openxmlformats.org/drawingml/2006/main" xmlns:r="http://schemas.openxmlformats.org/officeDocument/2006/relationships" xmlns:p="http://schemas.openxmlformats.org/presentationml/2006/main">
   <p:cSld>
     <p:spTree>
@@ -4490,7 +5304,7 @@
 </p:sld>
 </file>
 
-<file path=ppt/slides/slide8.xml><?xml version="1.0" encoding="utf-8"?>
+<file path=ppt/slides/slide9.xml><?xml version="1.0" encoding="utf-8"?>
 <p:sld xmlns:a="http://schemas.openxmlformats.org/drawingml/2006/main" xmlns:r="http://schemas.openxmlformats.org/officeDocument/2006/relationships" xmlns:p="http://schemas.openxmlformats.org/presentationml/2006/main">
   <p:cSld>
     <p:spTree>
@@ -4918,519 +5732,6 @@
         </p:txBody>
       </p:sp>
     </p:spTree>
-  </p:cSld>
-  <p:clrMapOvr>
-    <a:masterClrMapping/>
-  </p:clrMapOvr>
-  <mc:AlternateContent xmlns:mc="http://schemas.openxmlformats.org/markup-compatibility/2006" xmlns:p14="http://schemas.microsoft.com/office/powerpoint/2010/main">
-    <mc:Choice Requires="p14">
-      <p:transition spd="med" p14:dur="700">
-        <p:fade/>
-      </p:transition>
-    </mc:Choice>
-    <mc:Fallback xmlns="">
-      <p:transition spd="med">
-        <p:fade/>
-      </p:transition>
-    </mc:Fallback>
-  </mc:AlternateContent>
-</p:sld>
-</file>
-
-<file path=ppt/slides/slide9.xml><?xml version="1.0" encoding="utf-8"?>
-<p:sld xmlns:a="http://schemas.openxmlformats.org/drawingml/2006/main" xmlns:r="http://schemas.openxmlformats.org/officeDocument/2006/relationships" xmlns:p="http://schemas.openxmlformats.org/presentationml/2006/main">
-  <p:cSld>
-    <p:spTree>
-      <p:nvGrpSpPr>
-        <p:cNvPr id="1" name=""/>
-        <p:cNvGrpSpPr/>
-        <p:nvPr/>
-      </p:nvGrpSpPr>
-      <p:grpSpPr>
-        <a:xfrm>
-          <a:off x="0" y="0"/>
-          <a:ext cx="0" cy="0"/>
-          <a:chOff x="0" y="0"/>
-          <a:chExt cx="0" cy="0"/>
-        </a:xfrm>
-      </p:grpSpPr>
-      <p:sp>
-        <p:nvSpPr>
-          <p:cNvPr id="71" name="Shape 71"/>
-          <p:cNvSpPr>
-            <a:spLocks noGrp="1"/>
-          </p:cNvSpPr>
-          <p:nvPr>
-            <p:ph type="title"/>
-          </p:nvPr>
-        </p:nvSpPr>
-        <p:spPr>
-          <a:xfrm>
-            <a:off x="560715" y="178904"/>
-            <a:ext cx="11883370" cy="1074994"/>
-          </a:xfrm>
-          <a:prstGeom prst="rect">
-            <a:avLst/>
-          </a:prstGeom>
-        </p:spPr>
-        <p:txBody>
-          <a:bodyPr>
-            <a:normAutofit/>
-          </a:bodyPr>
-          <a:lstStyle/>
-          <a:p>
-            <a:r>
-              <a:rPr sz="5400" dirty="0">
-                <a:latin typeface="Arial Narrow" panose="020B0606020202030204" pitchFamily="34" charset="0"/>
-              </a:rPr>
-              <a:t>Código</a:t>
-            </a:r>
-          </a:p>
-        </p:txBody>
-      </p:sp>
-      <p:sp>
-        <p:nvSpPr>
-          <p:cNvPr id="72" name="Shape 72"/>
-          <p:cNvSpPr>
-            <a:spLocks noGrp="1"/>
-          </p:cNvSpPr>
-          <p:nvPr>
-            <p:ph type="body" idx="1"/>
-          </p:nvPr>
-        </p:nvSpPr>
-        <p:spPr>
-          <a:xfrm>
-            <a:off x="735792" y="1252331"/>
-            <a:ext cx="11708293" cy="8322365"/>
-          </a:xfrm>
-          <a:prstGeom prst="rect">
-            <a:avLst/>
-          </a:prstGeom>
-        </p:spPr>
-        <p:txBody>
-          <a:bodyPr>
-            <a:noAutofit/>
-          </a:bodyPr>
-          <a:lstStyle/>
-          <a:p>
-            <a:pPr marL="0" indent="0" defTabSz="543305">
-              <a:spcBef>
-                <a:spcPts val="100"/>
-              </a:spcBef>
-              <a:buNone/>
-              <a:defRPr sz="3348"/>
-            </a:pPr>
-            <a:r>
-              <a:rPr lang="en-US" sz="2400" dirty="0">
-                <a:latin typeface="Arial Narrow" panose="020B0606020202030204" pitchFamily="34" charset="0"/>
-              </a:rPr>
-              <a:t>    </a:t>
-            </a:r>
-            <a:r>
-              <a:rPr lang="en-US" sz="2800" dirty="0">
-                <a:highlight>
-                  <a:srgbClr val="C0C0C0"/>
-                </a:highlight>
-                <a:latin typeface="Arial Narrow" panose="020B0606020202030204" pitchFamily="34" charset="0"/>
-              </a:rPr>
-              <a:t>// For each node, which node it can most efficiently be reached from.</a:t>
-            </a:r>
-          </a:p>
-          <a:p>
-            <a:pPr marL="0" indent="0" defTabSz="543305">
-              <a:spcBef>
-                <a:spcPts val="100"/>
-              </a:spcBef>
-              <a:buNone/>
-              <a:defRPr sz="3348"/>
-            </a:pPr>
-            <a:r>
-              <a:rPr lang="en-US" sz="2800" dirty="0">
-                <a:latin typeface="Arial Narrow" panose="020B0606020202030204" pitchFamily="34" charset="0"/>
-              </a:rPr>
-              <a:t>    </a:t>
-            </a:r>
-            <a:r>
-              <a:rPr lang="en-US" sz="2800" dirty="0">
-                <a:highlight>
-                  <a:srgbClr val="C0C0C0"/>
-                </a:highlight>
-                <a:latin typeface="Arial Narrow" panose="020B0606020202030204" pitchFamily="34" charset="0"/>
-              </a:rPr>
-              <a:t>// If a node can be reached from many nodes, </a:t>
-            </a:r>
-            <a:r>
-              <a:rPr lang="en-US" sz="2800" dirty="0" err="1">
-                <a:highlight>
-                  <a:srgbClr val="C0C0C0"/>
-                </a:highlight>
-                <a:latin typeface="Arial Narrow" panose="020B0606020202030204" pitchFamily="34" charset="0"/>
-              </a:rPr>
-              <a:t>cameFrom</a:t>
-            </a:r>
-            <a:r>
-              <a:rPr lang="en-US" sz="2800" dirty="0">
-                <a:highlight>
-                  <a:srgbClr val="C0C0C0"/>
-                </a:highlight>
-                <a:latin typeface="Arial Narrow" panose="020B0606020202030204" pitchFamily="34" charset="0"/>
-              </a:rPr>
-              <a:t> will eventually contain the</a:t>
-            </a:r>
-          </a:p>
-          <a:p>
-            <a:pPr marL="0" indent="0" defTabSz="543305">
-              <a:spcBef>
-                <a:spcPts val="100"/>
-              </a:spcBef>
-              <a:buNone/>
-              <a:defRPr sz="3348"/>
-            </a:pPr>
-            <a:r>
-              <a:rPr lang="en-US" sz="2800" dirty="0">
-                <a:latin typeface="Arial Narrow" panose="020B0606020202030204" pitchFamily="34" charset="0"/>
-              </a:rPr>
-              <a:t>    </a:t>
-            </a:r>
-            <a:r>
-              <a:rPr lang="en-US" sz="2800" dirty="0">
-                <a:highlight>
-                  <a:srgbClr val="C0C0C0"/>
-                </a:highlight>
-                <a:latin typeface="Arial Narrow" panose="020B0606020202030204" pitchFamily="34" charset="0"/>
-              </a:rPr>
-              <a:t>// most efficient previous step.</a:t>
-            </a:r>
-          </a:p>
-          <a:p>
-            <a:pPr marL="0" indent="0" defTabSz="543305">
-              <a:spcBef>
-                <a:spcPts val="100"/>
-              </a:spcBef>
-              <a:buNone/>
-              <a:defRPr sz="3348"/>
-            </a:pPr>
-            <a:r>
-              <a:rPr lang="en-US" sz="2800" dirty="0">
-                <a:latin typeface="Arial Narrow" panose="020B0606020202030204" pitchFamily="34" charset="0"/>
-              </a:rPr>
-              <a:t>    </a:t>
-            </a:r>
-            <a:r>
-              <a:rPr lang="en-US" sz="2800" b="1" dirty="0" err="1">
-                <a:latin typeface="Arial Narrow" panose="020B0606020202030204" pitchFamily="34" charset="0"/>
-              </a:rPr>
-              <a:t>cameFrom</a:t>
-            </a:r>
-            <a:r>
-              <a:rPr lang="en-US" sz="2800" b="1" dirty="0">
-                <a:latin typeface="Arial Narrow" panose="020B0606020202030204" pitchFamily="34" charset="0"/>
-              </a:rPr>
-              <a:t> := an empty map</a:t>
-            </a:r>
-          </a:p>
-          <a:p>
-            <a:pPr marL="0" indent="0" defTabSz="543305">
-              <a:spcBef>
-                <a:spcPts val="100"/>
-              </a:spcBef>
-              <a:buNone/>
-              <a:defRPr sz="3348"/>
-            </a:pPr>
-            <a:endParaRPr lang="en-US" sz="2800" dirty="0">
-              <a:latin typeface="Arial Narrow" panose="020B0606020202030204" pitchFamily="34" charset="0"/>
-            </a:endParaRPr>
-          </a:p>
-          <a:p>
-            <a:pPr marL="0" indent="0" defTabSz="543305">
-              <a:spcBef>
-                <a:spcPts val="100"/>
-              </a:spcBef>
-              <a:buNone/>
-              <a:defRPr sz="3348"/>
-            </a:pPr>
-            <a:r>
-              <a:rPr lang="en-US" sz="2800" dirty="0">
-                <a:latin typeface="Arial Narrow" panose="020B0606020202030204" pitchFamily="34" charset="0"/>
-              </a:rPr>
-              <a:t>    </a:t>
-            </a:r>
-            <a:r>
-              <a:rPr lang="en-US" sz="2800" dirty="0">
-                <a:highlight>
-                  <a:srgbClr val="C0C0C0"/>
-                </a:highlight>
-                <a:latin typeface="Arial Narrow" panose="020B0606020202030204" pitchFamily="34" charset="0"/>
-              </a:rPr>
-              <a:t>// For each node, the cost of getting from the start node to that node.</a:t>
-            </a:r>
-          </a:p>
-          <a:p>
-            <a:pPr marL="0" indent="0" defTabSz="543305">
-              <a:spcBef>
-                <a:spcPts val="100"/>
-              </a:spcBef>
-              <a:buNone/>
-              <a:defRPr sz="3348"/>
-            </a:pPr>
-            <a:r>
-              <a:rPr lang="en-US" sz="2800" dirty="0">
-                <a:latin typeface="Arial Narrow" panose="020B0606020202030204" pitchFamily="34" charset="0"/>
-              </a:rPr>
-              <a:t>    </a:t>
-            </a:r>
-            <a:r>
-              <a:rPr lang="en-US" sz="2800" b="1" dirty="0" err="1">
-                <a:latin typeface="Arial Narrow" panose="020B0606020202030204" pitchFamily="34" charset="0"/>
-              </a:rPr>
-              <a:t>gScore</a:t>
-            </a:r>
-            <a:r>
-              <a:rPr lang="en-US" sz="2800" b="1" dirty="0">
-                <a:latin typeface="Arial Narrow" panose="020B0606020202030204" pitchFamily="34" charset="0"/>
-              </a:rPr>
-              <a:t> := map with default value of Infinity</a:t>
-            </a:r>
-          </a:p>
-          <a:p>
-            <a:pPr marL="0" indent="0" defTabSz="543305">
-              <a:spcBef>
-                <a:spcPts val="100"/>
-              </a:spcBef>
-              <a:buNone/>
-              <a:defRPr sz="3348"/>
-            </a:pPr>
-            <a:endParaRPr lang="en-US" sz="2800" dirty="0">
-              <a:latin typeface="Arial Narrow" panose="020B0606020202030204" pitchFamily="34" charset="0"/>
-            </a:endParaRPr>
-          </a:p>
-          <a:p>
-            <a:pPr marL="0" indent="0" defTabSz="543305">
-              <a:spcBef>
-                <a:spcPts val="100"/>
-              </a:spcBef>
-              <a:buNone/>
-              <a:defRPr sz="3348"/>
-            </a:pPr>
-            <a:r>
-              <a:rPr lang="en-US" sz="2800" dirty="0">
-                <a:latin typeface="Arial Narrow" panose="020B0606020202030204" pitchFamily="34" charset="0"/>
-              </a:rPr>
-              <a:t>    </a:t>
-            </a:r>
-            <a:r>
-              <a:rPr lang="en-US" sz="2800" dirty="0">
-                <a:highlight>
-                  <a:srgbClr val="C0C0C0"/>
-                </a:highlight>
-                <a:latin typeface="Arial Narrow" panose="020B0606020202030204" pitchFamily="34" charset="0"/>
-              </a:rPr>
-              <a:t>// The cost of going from start to start is zero.</a:t>
-            </a:r>
-          </a:p>
-          <a:p>
-            <a:pPr marL="0" indent="0" defTabSz="543305">
-              <a:spcBef>
-                <a:spcPts val="100"/>
-              </a:spcBef>
-              <a:buNone/>
-              <a:defRPr sz="3348"/>
-            </a:pPr>
-            <a:r>
-              <a:rPr lang="en-US" sz="2800" dirty="0">
-                <a:latin typeface="Arial Narrow" panose="020B0606020202030204" pitchFamily="34" charset="0"/>
-              </a:rPr>
-              <a:t>    </a:t>
-            </a:r>
-            <a:r>
-              <a:rPr lang="en-US" sz="2800" b="1" dirty="0" err="1">
-                <a:latin typeface="Arial Narrow" panose="020B0606020202030204" pitchFamily="34" charset="0"/>
-              </a:rPr>
-              <a:t>gScore</a:t>
-            </a:r>
-            <a:r>
-              <a:rPr lang="en-US" sz="2800" b="1" dirty="0">
-                <a:latin typeface="Arial Narrow" panose="020B0606020202030204" pitchFamily="34" charset="0"/>
-              </a:rPr>
-              <a:t>[start] := 0</a:t>
-            </a:r>
-          </a:p>
-          <a:p>
-            <a:pPr marL="0" indent="0" defTabSz="543305">
-              <a:spcBef>
-                <a:spcPts val="100"/>
-              </a:spcBef>
-              <a:buNone/>
-              <a:defRPr sz="3348"/>
-            </a:pPr>
-            <a:endParaRPr lang="en-US" sz="2800" dirty="0">
-              <a:latin typeface="Arial Narrow" panose="020B0606020202030204" pitchFamily="34" charset="0"/>
-            </a:endParaRPr>
-          </a:p>
-          <a:p>
-            <a:pPr marL="0" indent="0" defTabSz="543305">
-              <a:spcBef>
-                <a:spcPts val="100"/>
-              </a:spcBef>
-              <a:buNone/>
-              <a:defRPr sz="3348"/>
-            </a:pPr>
-            <a:r>
-              <a:rPr lang="en-US" sz="2800" dirty="0">
-                <a:latin typeface="Arial Narrow" panose="020B0606020202030204" pitchFamily="34" charset="0"/>
-              </a:rPr>
-              <a:t>    </a:t>
-            </a:r>
-            <a:r>
-              <a:rPr lang="en-US" sz="2800" dirty="0">
-                <a:highlight>
-                  <a:srgbClr val="C0C0C0"/>
-                </a:highlight>
-                <a:latin typeface="Arial Narrow" panose="020B0606020202030204" pitchFamily="34" charset="0"/>
-              </a:rPr>
-              <a:t>// For each node, the total cost of getting from the start node to the goal</a:t>
-            </a:r>
-          </a:p>
-          <a:p>
-            <a:pPr marL="0" indent="0" defTabSz="543305">
-              <a:spcBef>
-                <a:spcPts val="100"/>
-              </a:spcBef>
-              <a:buNone/>
-              <a:defRPr sz="3348"/>
-            </a:pPr>
-            <a:r>
-              <a:rPr lang="en-US" sz="2800" dirty="0">
-                <a:latin typeface="Arial Narrow" panose="020B0606020202030204" pitchFamily="34" charset="0"/>
-              </a:rPr>
-              <a:t>    </a:t>
-            </a:r>
-            <a:r>
-              <a:rPr lang="en-US" sz="2800" dirty="0">
-                <a:highlight>
-                  <a:srgbClr val="C0C0C0"/>
-                </a:highlight>
-                <a:latin typeface="Arial Narrow" panose="020B0606020202030204" pitchFamily="34" charset="0"/>
-              </a:rPr>
-              <a:t>// by passing by that node. That value is partly known, partly heuristic.</a:t>
-            </a:r>
-          </a:p>
-          <a:p>
-            <a:pPr marL="0" indent="0" defTabSz="543305">
-              <a:spcBef>
-                <a:spcPts val="100"/>
-              </a:spcBef>
-              <a:buNone/>
-              <a:defRPr sz="3348"/>
-            </a:pPr>
-            <a:r>
-              <a:rPr lang="en-US" sz="2800" dirty="0">
-                <a:latin typeface="Arial Narrow" panose="020B0606020202030204" pitchFamily="34" charset="0"/>
-              </a:rPr>
-              <a:t>   </a:t>
-            </a:r>
-            <a:r>
-              <a:rPr lang="en-US" sz="2800" b="1" dirty="0">
-                <a:latin typeface="Arial Narrow" panose="020B0606020202030204" pitchFamily="34" charset="0"/>
-              </a:rPr>
-              <a:t> </a:t>
-            </a:r>
-            <a:r>
-              <a:rPr lang="en-US" sz="2800" b="1" dirty="0" err="1">
-                <a:latin typeface="Arial Narrow" panose="020B0606020202030204" pitchFamily="34" charset="0"/>
-              </a:rPr>
-              <a:t>fScore</a:t>
-            </a:r>
-            <a:r>
-              <a:rPr lang="en-US" sz="2800" b="1" dirty="0">
-                <a:latin typeface="Arial Narrow" panose="020B0606020202030204" pitchFamily="34" charset="0"/>
-              </a:rPr>
-              <a:t> := map with default value of Infinity</a:t>
-            </a:r>
-          </a:p>
-          <a:p>
-            <a:pPr marL="0" indent="0" defTabSz="543305">
-              <a:spcBef>
-                <a:spcPts val="100"/>
-              </a:spcBef>
-              <a:buNone/>
-              <a:defRPr sz="3348"/>
-            </a:pPr>
-            <a:endParaRPr lang="en-US" sz="2800" dirty="0">
-              <a:latin typeface="Arial Narrow" panose="020B0606020202030204" pitchFamily="34" charset="0"/>
-            </a:endParaRPr>
-          </a:p>
-          <a:p>
-            <a:pPr marL="0" indent="0" defTabSz="543305">
-              <a:spcBef>
-                <a:spcPts val="100"/>
-              </a:spcBef>
-              <a:buNone/>
-              <a:defRPr sz="3348"/>
-            </a:pPr>
-            <a:r>
-              <a:rPr lang="en-US" sz="2800" dirty="0">
-                <a:latin typeface="Arial Narrow" panose="020B0606020202030204" pitchFamily="34" charset="0"/>
-              </a:rPr>
-              <a:t>    </a:t>
-            </a:r>
-            <a:r>
-              <a:rPr lang="en-US" sz="2800" dirty="0">
-                <a:highlight>
-                  <a:srgbClr val="C0C0C0"/>
-                </a:highlight>
-                <a:latin typeface="Arial Narrow" panose="020B0606020202030204" pitchFamily="34" charset="0"/>
-              </a:rPr>
-              <a:t>// For the first node, that value is completely heuristic.</a:t>
-            </a:r>
-          </a:p>
-          <a:p>
-            <a:pPr marL="0" indent="0" defTabSz="543305">
-              <a:spcBef>
-                <a:spcPts val="100"/>
-              </a:spcBef>
-              <a:buNone/>
-              <a:defRPr sz="3348"/>
-            </a:pPr>
-            <a:r>
-              <a:rPr lang="en-US" sz="2800" dirty="0">
-                <a:latin typeface="Arial Narrow" panose="020B0606020202030204" pitchFamily="34" charset="0"/>
-              </a:rPr>
-              <a:t>    </a:t>
-            </a:r>
-            <a:r>
-              <a:rPr lang="en-US" sz="2800" b="1" dirty="0" err="1">
-                <a:latin typeface="Arial Narrow" panose="020B0606020202030204" pitchFamily="34" charset="0"/>
-              </a:rPr>
-              <a:t>fScore</a:t>
-            </a:r>
-            <a:r>
-              <a:rPr lang="en-US" sz="2800" b="1" dirty="0">
-                <a:latin typeface="Arial Narrow" panose="020B0606020202030204" pitchFamily="34" charset="0"/>
-              </a:rPr>
-              <a:t>[start] := </a:t>
-            </a:r>
-            <a:r>
-              <a:rPr lang="en-US" sz="2800" b="1" dirty="0" err="1">
-                <a:latin typeface="Arial Narrow" panose="020B0606020202030204" pitchFamily="34" charset="0"/>
-              </a:rPr>
-              <a:t>heuristic_cost_estimate</a:t>
-            </a:r>
-            <a:r>
-              <a:rPr lang="en-US" sz="2800" b="1" dirty="0">
-                <a:latin typeface="Arial Narrow" panose="020B0606020202030204" pitchFamily="34" charset="0"/>
-              </a:rPr>
-              <a:t>(start, goal)</a:t>
-            </a:r>
-          </a:p>
-        </p:txBody>
-      </p:sp>
-    </p:spTree>
-    <p:extLst>
-      <p:ext uri="{BB962C8B-B14F-4D97-AF65-F5344CB8AC3E}">
-        <p14:creationId xmlns:p14="http://schemas.microsoft.com/office/powerpoint/2010/main" val="2168827275"/>
-      </p:ext>
-    </p:extLst>
   </p:cSld>
   <p:clrMapOvr>
     <a:masterClrMapping/>

</xml_diff>

<commit_message>
Remoção de um slide desnecessário
</commit_message>
<xml_diff>
--- a/Seminário - A Star/A Star.pptx
+++ b/Seminário - A Star/A Star.pptx
@@ -5,7 +5,7 @@
     <p:sldMasterId id="2147483648" r:id="rId1"/>
   </p:sldMasterIdLst>
   <p:notesMasterIdLst>
-    <p:notesMasterId r:id="rId17"/>
+    <p:notesMasterId r:id="rId16"/>
   </p:notesMasterIdLst>
   <p:sldIdLst>
     <p:sldId id="256" r:id="rId2"/>
@@ -15,14 +15,13 @@
     <p:sldId id="272" r:id="rId6"/>
     <p:sldId id="275" r:id="rId7"/>
     <p:sldId id="259" r:id="rId8"/>
-    <p:sldId id="269" r:id="rId9"/>
-    <p:sldId id="260" r:id="rId10"/>
-    <p:sldId id="273" r:id="rId11"/>
-    <p:sldId id="274" r:id="rId12"/>
-    <p:sldId id="261" r:id="rId13"/>
-    <p:sldId id="270" r:id="rId14"/>
-    <p:sldId id="262" r:id="rId15"/>
-    <p:sldId id="266" r:id="rId16"/>
+    <p:sldId id="260" r:id="rId9"/>
+    <p:sldId id="273" r:id="rId10"/>
+    <p:sldId id="274" r:id="rId11"/>
+    <p:sldId id="261" r:id="rId12"/>
+    <p:sldId id="270" r:id="rId13"/>
+    <p:sldId id="262" r:id="rId14"/>
+    <p:sldId id="266" r:id="rId15"/>
   </p:sldIdLst>
   <p:sldSz cx="13004800" cy="9753600"/>
   <p:notesSz cx="6858000" cy="9144000"/>
@@ -958,7 +957,7 @@
           </a:ln>
           <a:extLst>
             <a:ext uri="{C572A759-6A51-4108-AA02-DFA0A04FC94B}">
-              <ma14:wrappingTextBoxFlag xmlns:ma14="http://schemas.microsoft.com/office/mac/drawingml/2011/main" xmlns="" val="1"/>
+              <ma14:wrappingTextBoxFlag xmlns="" xmlns:ma14="http://schemas.microsoft.com/office/mac/drawingml/2011/main" val="1"/>
             </a:ext>
           </a:extLst>
         </p:spPr>
@@ -997,7 +996,7 @@
           </a:ln>
           <a:extLst>
             <a:ext uri="{C572A759-6A51-4108-AA02-DFA0A04FC94B}">
-              <ma14:wrappingTextBoxFlag xmlns:ma14="http://schemas.microsoft.com/office/mac/drawingml/2011/main" xmlns="" val="1"/>
+              <ma14:wrappingTextBoxFlag xmlns="" xmlns:ma14="http://schemas.microsoft.com/office/mac/drawingml/2011/main" val="1"/>
             </a:ext>
           </a:extLst>
         </p:spPr>
@@ -1987,7 +1986,7 @@
           </a:ln>
           <a:extLst>
             <a:ext uri="{C572A759-6A51-4108-AA02-DFA0A04FC94B}">
-              <ma14:wrappingTextBoxFlag xmlns:ma14="http://schemas.microsoft.com/office/mac/drawingml/2011/main" xmlns="" val="1"/>
+              <ma14:wrappingTextBoxFlag xmlns="" xmlns:ma14="http://schemas.microsoft.com/office/mac/drawingml/2011/main" val="1"/>
             </a:ext>
           </a:extLst>
         </p:spPr>
@@ -2033,7 +2032,7 @@
           </a:ln>
           <a:extLst>
             <a:ext uri="{C572A759-6A51-4108-AA02-DFA0A04FC94B}">
-              <ma14:wrappingTextBoxFlag xmlns:ma14="http://schemas.microsoft.com/office/mac/drawingml/2011/main" xmlns="" val="1"/>
+              <ma14:wrappingTextBoxFlag xmlns="" xmlns:ma14="http://schemas.microsoft.com/office/mac/drawingml/2011/main" val="1"/>
             </a:ext>
           </a:extLst>
         </p:spPr>
@@ -2263,519 +2262,6 @@
         <p:spPr>
           <a:xfrm>
             <a:off x="735792" y="1252331"/>
-            <a:ext cx="11708293" cy="8322365"/>
-          </a:xfrm>
-          <a:prstGeom prst="rect">
-            <a:avLst/>
-          </a:prstGeom>
-        </p:spPr>
-        <p:txBody>
-          <a:bodyPr>
-            <a:noAutofit/>
-          </a:bodyPr>
-          <a:lstStyle/>
-          <a:p>
-            <a:pPr marL="0" indent="0" defTabSz="543305">
-              <a:spcBef>
-                <a:spcPts val="100"/>
-              </a:spcBef>
-              <a:buNone/>
-              <a:defRPr sz="3348"/>
-            </a:pPr>
-            <a:r>
-              <a:rPr lang="en-US" sz="2400" dirty="0">
-                <a:latin typeface="Arial Narrow" panose="020B0606020202030204" pitchFamily="34" charset="0"/>
-              </a:rPr>
-              <a:t>    </a:t>
-            </a:r>
-            <a:r>
-              <a:rPr lang="en-US" sz="2800" dirty="0">
-                <a:highlight>
-                  <a:srgbClr val="C0C0C0"/>
-                </a:highlight>
-                <a:latin typeface="Arial Narrow" panose="020B0606020202030204" pitchFamily="34" charset="0"/>
-              </a:rPr>
-              <a:t>// For each node, which node it can most efficiently be reached from.</a:t>
-            </a:r>
-          </a:p>
-          <a:p>
-            <a:pPr marL="0" indent="0" defTabSz="543305">
-              <a:spcBef>
-                <a:spcPts val="100"/>
-              </a:spcBef>
-              <a:buNone/>
-              <a:defRPr sz="3348"/>
-            </a:pPr>
-            <a:r>
-              <a:rPr lang="en-US" sz="2800" dirty="0">
-                <a:latin typeface="Arial Narrow" panose="020B0606020202030204" pitchFamily="34" charset="0"/>
-              </a:rPr>
-              <a:t>    </a:t>
-            </a:r>
-            <a:r>
-              <a:rPr lang="en-US" sz="2800" dirty="0">
-                <a:highlight>
-                  <a:srgbClr val="C0C0C0"/>
-                </a:highlight>
-                <a:latin typeface="Arial Narrow" panose="020B0606020202030204" pitchFamily="34" charset="0"/>
-              </a:rPr>
-              <a:t>// If a node can be reached from many nodes, </a:t>
-            </a:r>
-            <a:r>
-              <a:rPr lang="en-US" sz="2800" dirty="0" err="1">
-                <a:highlight>
-                  <a:srgbClr val="C0C0C0"/>
-                </a:highlight>
-                <a:latin typeface="Arial Narrow" panose="020B0606020202030204" pitchFamily="34" charset="0"/>
-              </a:rPr>
-              <a:t>cameFrom</a:t>
-            </a:r>
-            <a:r>
-              <a:rPr lang="en-US" sz="2800" dirty="0">
-                <a:highlight>
-                  <a:srgbClr val="C0C0C0"/>
-                </a:highlight>
-                <a:latin typeface="Arial Narrow" panose="020B0606020202030204" pitchFamily="34" charset="0"/>
-              </a:rPr>
-              <a:t> will eventually contain the</a:t>
-            </a:r>
-          </a:p>
-          <a:p>
-            <a:pPr marL="0" indent="0" defTabSz="543305">
-              <a:spcBef>
-                <a:spcPts val="100"/>
-              </a:spcBef>
-              <a:buNone/>
-              <a:defRPr sz="3348"/>
-            </a:pPr>
-            <a:r>
-              <a:rPr lang="en-US" sz="2800" dirty="0">
-                <a:latin typeface="Arial Narrow" panose="020B0606020202030204" pitchFamily="34" charset="0"/>
-              </a:rPr>
-              <a:t>    </a:t>
-            </a:r>
-            <a:r>
-              <a:rPr lang="en-US" sz="2800" dirty="0">
-                <a:highlight>
-                  <a:srgbClr val="C0C0C0"/>
-                </a:highlight>
-                <a:latin typeface="Arial Narrow" panose="020B0606020202030204" pitchFamily="34" charset="0"/>
-              </a:rPr>
-              <a:t>// most efficient previous step.</a:t>
-            </a:r>
-          </a:p>
-          <a:p>
-            <a:pPr marL="0" indent="0" defTabSz="543305">
-              <a:spcBef>
-                <a:spcPts val="100"/>
-              </a:spcBef>
-              <a:buNone/>
-              <a:defRPr sz="3348"/>
-            </a:pPr>
-            <a:r>
-              <a:rPr lang="en-US" sz="2800" dirty="0">
-                <a:latin typeface="Arial Narrow" panose="020B0606020202030204" pitchFamily="34" charset="0"/>
-              </a:rPr>
-              <a:t>    </a:t>
-            </a:r>
-            <a:r>
-              <a:rPr lang="en-US" sz="2800" b="1" dirty="0" err="1">
-                <a:latin typeface="Arial Narrow" panose="020B0606020202030204" pitchFamily="34" charset="0"/>
-              </a:rPr>
-              <a:t>cameFrom</a:t>
-            </a:r>
-            <a:r>
-              <a:rPr lang="en-US" sz="2800" b="1" dirty="0">
-                <a:latin typeface="Arial Narrow" panose="020B0606020202030204" pitchFamily="34" charset="0"/>
-              </a:rPr>
-              <a:t> := an empty map</a:t>
-            </a:r>
-          </a:p>
-          <a:p>
-            <a:pPr marL="0" indent="0" defTabSz="543305">
-              <a:spcBef>
-                <a:spcPts val="100"/>
-              </a:spcBef>
-              <a:buNone/>
-              <a:defRPr sz="3348"/>
-            </a:pPr>
-            <a:endParaRPr lang="en-US" sz="2800" dirty="0">
-              <a:latin typeface="Arial Narrow" panose="020B0606020202030204" pitchFamily="34" charset="0"/>
-            </a:endParaRPr>
-          </a:p>
-          <a:p>
-            <a:pPr marL="0" indent="0" defTabSz="543305">
-              <a:spcBef>
-                <a:spcPts val="100"/>
-              </a:spcBef>
-              <a:buNone/>
-              <a:defRPr sz="3348"/>
-            </a:pPr>
-            <a:r>
-              <a:rPr lang="en-US" sz="2800" dirty="0">
-                <a:latin typeface="Arial Narrow" panose="020B0606020202030204" pitchFamily="34" charset="0"/>
-              </a:rPr>
-              <a:t>    </a:t>
-            </a:r>
-            <a:r>
-              <a:rPr lang="en-US" sz="2800" dirty="0">
-                <a:highlight>
-                  <a:srgbClr val="C0C0C0"/>
-                </a:highlight>
-                <a:latin typeface="Arial Narrow" panose="020B0606020202030204" pitchFamily="34" charset="0"/>
-              </a:rPr>
-              <a:t>// For each node, the cost of getting from the start node to that node.</a:t>
-            </a:r>
-          </a:p>
-          <a:p>
-            <a:pPr marL="0" indent="0" defTabSz="543305">
-              <a:spcBef>
-                <a:spcPts val="100"/>
-              </a:spcBef>
-              <a:buNone/>
-              <a:defRPr sz="3348"/>
-            </a:pPr>
-            <a:r>
-              <a:rPr lang="en-US" sz="2800" dirty="0">
-                <a:latin typeface="Arial Narrow" panose="020B0606020202030204" pitchFamily="34" charset="0"/>
-              </a:rPr>
-              <a:t>    </a:t>
-            </a:r>
-            <a:r>
-              <a:rPr lang="en-US" sz="2800" b="1" dirty="0" err="1">
-                <a:latin typeface="Arial Narrow" panose="020B0606020202030204" pitchFamily="34" charset="0"/>
-              </a:rPr>
-              <a:t>gScore</a:t>
-            </a:r>
-            <a:r>
-              <a:rPr lang="en-US" sz="2800" b="1" dirty="0">
-                <a:latin typeface="Arial Narrow" panose="020B0606020202030204" pitchFamily="34" charset="0"/>
-              </a:rPr>
-              <a:t> := map with default value of Infinity</a:t>
-            </a:r>
-          </a:p>
-          <a:p>
-            <a:pPr marL="0" indent="0" defTabSz="543305">
-              <a:spcBef>
-                <a:spcPts val="100"/>
-              </a:spcBef>
-              <a:buNone/>
-              <a:defRPr sz="3348"/>
-            </a:pPr>
-            <a:endParaRPr lang="en-US" sz="2800" dirty="0">
-              <a:latin typeface="Arial Narrow" panose="020B0606020202030204" pitchFamily="34" charset="0"/>
-            </a:endParaRPr>
-          </a:p>
-          <a:p>
-            <a:pPr marL="0" indent="0" defTabSz="543305">
-              <a:spcBef>
-                <a:spcPts val="100"/>
-              </a:spcBef>
-              <a:buNone/>
-              <a:defRPr sz="3348"/>
-            </a:pPr>
-            <a:r>
-              <a:rPr lang="en-US" sz="2800" dirty="0">
-                <a:latin typeface="Arial Narrow" panose="020B0606020202030204" pitchFamily="34" charset="0"/>
-              </a:rPr>
-              <a:t>    </a:t>
-            </a:r>
-            <a:r>
-              <a:rPr lang="en-US" sz="2800" dirty="0">
-                <a:highlight>
-                  <a:srgbClr val="C0C0C0"/>
-                </a:highlight>
-                <a:latin typeface="Arial Narrow" panose="020B0606020202030204" pitchFamily="34" charset="0"/>
-              </a:rPr>
-              <a:t>// The cost of going from start to start is zero.</a:t>
-            </a:r>
-          </a:p>
-          <a:p>
-            <a:pPr marL="0" indent="0" defTabSz="543305">
-              <a:spcBef>
-                <a:spcPts val="100"/>
-              </a:spcBef>
-              <a:buNone/>
-              <a:defRPr sz="3348"/>
-            </a:pPr>
-            <a:r>
-              <a:rPr lang="en-US" sz="2800" dirty="0">
-                <a:latin typeface="Arial Narrow" panose="020B0606020202030204" pitchFamily="34" charset="0"/>
-              </a:rPr>
-              <a:t>    </a:t>
-            </a:r>
-            <a:r>
-              <a:rPr lang="en-US" sz="2800" b="1" dirty="0" err="1">
-                <a:latin typeface="Arial Narrow" panose="020B0606020202030204" pitchFamily="34" charset="0"/>
-              </a:rPr>
-              <a:t>gScore</a:t>
-            </a:r>
-            <a:r>
-              <a:rPr lang="en-US" sz="2800" b="1" dirty="0">
-                <a:latin typeface="Arial Narrow" panose="020B0606020202030204" pitchFamily="34" charset="0"/>
-              </a:rPr>
-              <a:t>[start] := 0</a:t>
-            </a:r>
-          </a:p>
-          <a:p>
-            <a:pPr marL="0" indent="0" defTabSz="543305">
-              <a:spcBef>
-                <a:spcPts val="100"/>
-              </a:spcBef>
-              <a:buNone/>
-              <a:defRPr sz="3348"/>
-            </a:pPr>
-            <a:endParaRPr lang="en-US" sz="2800" dirty="0">
-              <a:latin typeface="Arial Narrow" panose="020B0606020202030204" pitchFamily="34" charset="0"/>
-            </a:endParaRPr>
-          </a:p>
-          <a:p>
-            <a:pPr marL="0" indent="0" defTabSz="543305">
-              <a:spcBef>
-                <a:spcPts val="100"/>
-              </a:spcBef>
-              <a:buNone/>
-              <a:defRPr sz="3348"/>
-            </a:pPr>
-            <a:r>
-              <a:rPr lang="en-US" sz="2800" dirty="0">
-                <a:latin typeface="Arial Narrow" panose="020B0606020202030204" pitchFamily="34" charset="0"/>
-              </a:rPr>
-              <a:t>    </a:t>
-            </a:r>
-            <a:r>
-              <a:rPr lang="en-US" sz="2800" dirty="0">
-                <a:highlight>
-                  <a:srgbClr val="C0C0C0"/>
-                </a:highlight>
-                <a:latin typeface="Arial Narrow" panose="020B0606020202030204" pitchFamily="34" charset="0"/>
-              </a:rPr>
-              <a:t>// For each node, the total cost of getting from the start node to the goal</a:t>
-            </a:r>
-          </a:p>
-          <a:p>
-            <a:pPr marL="0" indent="0" defTabSz="543305">
-              <a:spcBef>
-                <a:spcPts val="100"/>
-              </a:spcBef>
-              <a:buNone/>
-              <a:defRPr sz="3348"/>
-            </a:pPr>
-            <a:r>
-              <a:rPr lang="en-US" sz="2800" dirty="0">
-                <a:latin typeface="Arial Narrow" panose="020B0606020202030204" pitchFamily="34" charset="0"/>
-              </a:rPr>
-              <a:t>    </a:t>
-            </a:r>
-            <a:r>
-              <a:rPr lang="en-US" sz="2800" dirty="0">
-                <a:highlight>
-                  <a:srgbClr val="C0C0C0"/>
-                </a:highlight>
-                <a:latin typeface="Arial Narrow" panose="020B0606020202030204" pitchFamily="34" charset="0"/>
-              </a:rPr>
-              <a:t>// by passing by that node. That value is partly known, partly heuristic.</a:t>
-            </a:r>
-          </a:p>
-          <a:p>
-            <a:pPr marL="0" indent="0" defTabSz="543305">
-              <a:spcBef>
-                <a:spcPts val="100"/>
-              </a:spcBef>
-              <a:buNone/>
-              <a:defRPr sz="3348"/>
-            </a:pPr>
-            <a:r>
-              <a:rPr lang="en-US" sz="2800" dirty="0">
-                <a:latin typeface="Arial Narrow" panose="020B0606020202030204" pitchFamily="34" charset="0"/>
-              </a:rPr>
-              <a:t>   </a:t>
-            </a:r>
-            <a:r>
-              <a:rPr lang="en-US" sz="2800" b="1" dirty="0">
-                <a:latin typeface="Arial Narrow" panose="020B0606020202030204" pitchFamily="34" charset="0"/>
-              </a:rPr>
-              <a:t> </a:t>
-            </a:r>
-            <a:r>
-              <a:rPr lang="en-US" sz="2800" b="1" dirty="0" err="1">
-                <a:latin typeface="Arial Narrow" panose="020B0606020202030204" pitchFamily="34" charset="0"/>
-              </a:rPr>
-              <a:t>fScore</a:t>
-            </a:r>
-            <a:r>
-              <a:rPr lang="en-US" sz="2800" b="1" dirty="0">
-                <a:latin typeface="Arial Narrow" panose="020B0606020202030204" pitchFamily="34" charset="0"/>
-              </a:rPr>
-              <a:t> := map with default value of Infinity</a:t>
-            </a:r>
-          </a:p>
-          <a:p>
-            <a:pPr marL="0" indent="0" defTabSz="543305">
-              <a:spcBef>
-                <a:spcPts val="100"/>
-              </a:spcBef>
-              <a:buNone/>
-              <a:defRPr sz="3348"/>
-            </a:pPr>
-            <a:endParaRPr lang="en-US" sz="2800" dirty="0">
-              <a:latin typeface="Arial Narrow" panose="020B0606020202030204" pitchFamily="34" charset="0"/>
-            </a:endParaRPr>
-          </a:p>
-          <a:p>
-            <a:pPr marL="0" indent="0" defTabSz="543305">
-              <a:spcBef>
-                <a:spcPts val="100"/>
-              </a:spcBef>
-              <a:buNone/>
-              <a:defRPr sz="3348"/>
-            </a:pPr>
-            <a:r>
-              <a:rPr lang="en-US" sz="2800" dirty="0">
-                <a:latin typeface="Arial Narrow" panose="020B0606020202030204" pitchFamily="34" charset="0"/>
-              </a:rPr>
-              <a:t>    </a:t>
-            </a:r>
-            <a:r>
-              <a:rPr lang="en-US" sz="2800" dirty="0">
-                <a:highlight>
-                  <a:srgbClr val="C0C0C0"/>
-                </a:highlight>
-                <a:latin typeface="Arial Narrow" panose="020B0606020202030204" pitchFamily="34" charset="0"/>
-              </a:rPr>
-              <a:t>// For the first node, that value is completely heuristic.</a:t>
-            </a:r>
-          </a:p>
-          <a:p>
-            <a:pPr marL="0" indent="0" defTabSz="543305">
-              <a:spcBef>
-                <a:spcPts val="100"/>
-              </a:spcBef>
-              <a:buNone/>
-              <a:defRPr sz="3348"/>
-            </a:pPr>
-            <a:r>
-              <a:rPr lang="en-US" sz="2800" dirty="0">
-                <a:latin typeface="Arial Narrow" panose="020B0606020202030204" pitchFamily="34" charset="0"/>
-              </a:rPr>
-              <a:t>    </a:t>
-            </a:r>
-            <a:r>
-              <a:rPr lang="en-US" sz="2800" b="1" dirty="0" err="1">
-                <a:latin typeface="Arial Narrow" panose="020B0606020202030204" pitchFamily="34" charset="0"/>
-              </a:rPr>
-              <a:t>fScore</a:t>
-            </a:r>
-            <a:r>
-              <a:rPr lang="en-US" sz="2800" b="1" dirty="0">
-                <a:latin typeface="Arial Narrow" panose="020B0606020202030204" pitchFamily="34" charset="0"/>
-              </a:rPr>
-              <a:t>[start] := </a:t>
-            </a:r>
-            <a:r>
-              <a:rPr lang="en-US" sz="2800" b="1" dirty="0" err="1">
-                <a:latin typeface="Arial Narrow" panose="020B0606020202030204" pitchFamily="34" charset="0"/>
-              </a:rPr>
-              <a:t>heuristic_cost_estimate</a:t>
-            </a:r>
-            <a:r>
-              <a:rPr lang="en-US" sz="2800" b="1" dirty="0">
-                <a:latin typeface="Arial Narrow" panose="020B0606020202030204" pitchFamily="34" charset="0"/>
-              </a:rPr>
-              <a:t>(start, goal)</a:t>
-            </a:r>
-          </a:p>
-        </p:txBody>
-      </p:sp>
-    </p:spTree>
-    <p:extLst>
-      <p:ext uri="{BB962C8B-B14F-4D97-AF65-F5344CB8AC3E}">
-        <p14:creationId xmlns:p14="http://schemas.microsoft.com/office/powerpoint/2010/main" val="2168827275"/>
-      </p:ext>
-    </p:extLst>
-  </p:cSld>
-  <p:clrMapOvr>
-    <a:masterClrMapping/>
-  </p:clrMapOvr>
-  <mc:AlternateContent xmlns:mc="http://schemas.openxmlformats.org/markup-compatibility/2006" xmlns:p14="http://schemas.microsoft.com/office/powerpoint/2010/main">
-    <mc:Choice Requires="p14">
-      <p:transition spd="med" p14:dur="700">
-        <p:fade/>
-      </p:transition>
-    </mc:Choice>
-    <mc:Fallback xmlns="">
-      <p:transition spd="med">
-        <p:fade/>
-      </p:transition>
-    </mc:Fallback>
-  </mc:AlternateContent>
-</p:sld>
-</file>
-
-<file path=ppt/slides/slide11.xml><?xml version="1.0" encoding="utf-8"?>
-<p:sld xmlns:a="http://schemas.openxmlformats.org/drawingml/2006/main" xmlns:r="http://schemas.openxmlformats.org/officeDocument/2006/relationships" xmlns:p="http://schemas.openxmlformats.org/presentationml/2006/main">
-  <p:cSld>
-    <p:spTree>
-      <p:nvGrpSpPr>
-        <p:cNvPr id="1" name=""/>
-        <p:cNvGrpSpPr/>
-        <p:nvPr/>
-      </p:nvGrpSpPr>
-      <p:grpSpPr>
-        <a:xfrm>
-          <a:off x="0" y="0"/>
-          <a:ext cx="0" cy="0"/>
-          <a:chOff x="0" y="0"/>
-          <a:chExt cx="0" cy="0"/>
-        </a:xfrm>
-      </p:grpSpPr>
-      <p:sp>
-        <p:nvSpPr>
-          <p:cNvPr id="71" name="Shape 71"/>
-          <p:cNvSpPr>
-            <a:spLocks noGrp="1"/>
-          </p:cNvSpPr>
-          <p:nvPr>
-            <p:ph type="title"/>
-          </p:nvPr>
-        </p:nvSpPr>
-        <p:spPr>
-          <a:xfrm>
-            <a:off x="560715" y="178904"/>
-            <a:ext cx="11883370" cy="1074994"/>
-          </a:xfrm>
-          <a:prstGeom prst="rect">
-            <a:avLst/>
-          </a:prstGeom>
-        </p:spPr>
-        <p:txBody>
-          <a:bodyPr>
-            <a:normAutofit/>
-          </a:bodyPr>
-          <a:lstStyle/>
-          <a:p>
-            <a:r>
-              <a:rPr sz="5400" dirty="0">
-                <a:latin typeface="Arial Narrow" panose="020B0606020202030204" pitchFamily="34" charset="0"/>
-              </a:rPr>
-              <a:t>Código</a:t>
-            </a:r>
-          </a:p>
-        </p:txBody>
-      </p:sp>
-      <p:sp>
-        <p:nvSpPr>
-          <p:cNvPr id="72" name="Shape 72"/>
-          <p:cNvSpPr>
-            <a:spLocks noGrp="1"/>
-          </p:cNvSpPr>
-          <p:nvPr>
-            <p:ph type="body" idx="1"/>
-          </p:nvPr>
-        </p:nvSpPr>
-        <p:spPr>
-          <a:xfrm>
-            <a:off x="735792" y="1252331"/>
             <a:ext cx="11708293" cy="8169965"/>
           </a:xfrm>
           <a:prstGeom prst="rect">
@@ -3474,7 +2960,7 @@
 </p:sld>
 </file>
 
-<file path=ppt/slides/slide12.xml><?xml version="1.0" encoding="utf-8"?>
+<file path=ppt/slides/slide11.xml><?xml version="1.0" encoding="utf-8"?>
 <p:sld xmlns:a="http://schemas.openxmlformats.org/drawingml/2006/main" xmlns:r="http://schemas.openxmlformats.org/officeDocument/2006/relationships" xmlns:p="http://schemas.openxmlformats.org/presentationml/2006/main">
   <p:cSld>
     <p:spTree>
@@ -3630,7 +3116,7 @@
 </p:sld>
 </file>
 
-<file path=ppt/slides/slide13.xml><?xml version="1.0" encoding="utf-8"?>
+<file path=ppt/slides/slide12.xml><?xml version="1.0" encoding="utf-8"?>
 <p:sld xmlns:a="http://schemas.openxmlformats.org/drawingml/2006/main" xmlns:r="http://schemas.openxmlformats.org/officeDocument/2006/relationships" xmlns:p="http://schemas.openxmlformats.org/presentationml/2006/main">
   <p:cSld>
     <p:spTree>
@@ -3773,7 +3259,7 @@
 </p:sld>
 </file>
 
-<file path=ppt/slides/slide14.xml><?xml version="1.0" encoding="utf-8"?>
+<file path=ppt/slides/slide13.xml><?xml version="1.0" encoding="utf-8"?>
 <p:sld xmlns:a="http://schemas.openxmlformats.org/drawingml/2006/main" xmlns:r="http://schemas.openxmlformats.org/officeDocument/2006/relationships" xmlns:p="http://schemas.openxmlformats.org/presentationml/2006/main">
   <p:cSld>
     <p:spTree>
@@ -3920,7 +3406,7 @@
 </p:sld>
 </file>
 
-<file path=ppt/slides/slide15.xml><?xml version="1.0" encoding="utf-8"?>
+<file path=ppt/slides/slide14.xml><?xml version="1.0" encoding="utf-8"?>
 <p:sld xmlns:a="http://schemas.openxmlformats.org/drawingml/2006/main" xmlns:r="http://schemas.openxmlformats.org/officeDocument/2006/relationships" xmlns:p="http://schemas.openxmlformats.org/presentationml/2006/main">
   <p:cSld>
     <p:spTree>
@@ -4714,8 +4200,8 @@
           </a:p>
         </p:txBody>
       </p:sp>
-      <mc:AlternateContent xmlns:mc="http://schemas.openxmlformats.org/markup-compatibility/2006">
-        <mc:Choice xmlns:a14="http://schemas.microsoft.com/office/drawing/2010/main" Requires="a14">
+      <mc:AlternateContent xmlns:mc="http://schemas.openxmlformats.org/markup-compatibility/2006" xmlns:a14="http://schemas.microsoft.com/office/drawing/2010/main">
+        <mc:Choice Requires="a14">
           <p:sp>
             <p:nvSpPr>
               <p:cNvPr id="63" name="Shape 63"/>
@@ -4901,7 +4387,7 @@
             </p:txBody>
           </p:sp>
         </mc:Choice>
-        <mc:Fallback>
+        <mc:Fallback xmlns="">
           <p:sp>
             <p:nvSpPr>
               <p:cNvPr id="63" name="Shape 63"/>
@@ -5162,7 +4648,7 @@
       </p:grpSpPr>
       <p:sp>
         <p:nvSpPr>
-          <p:cNvPr id="68" name="Shape 68"/>
+          <p:cNvPr id="71" name="Shape 71"/>
           <p:cNvSpPr>
             <a:spLocks noGrp="1"/>
           </p:cNvSpPr>
@@ -5176,24 +4662,23 @@
           </a:prstGeom>
         </p:spPr>
         <p:txBody>
-          <a:bodyPr/>
+          <a:bodyPr>
+            <a:normAutofit/>
+          </a:bodyPr>
           <a:lstStyle/>
           <a:p>
             <a:r>
-              <a:rPr sz="5400" dirty="0" err="1">
-                <a:latin typeface="Arial Narrow" panose="020B0606020202030204" pitchFamily="34" charset="0"/>
-              </a:rPr>
-              <a:t>Definições</a:t>
-            </a:r>
-            <a:endParaRPr dirty="0">
-              <a:latin typeface="Arial Narrow" panose="020B0606020202030204" pitchFamily="34" charset="0"/>
-            </a:endParaRPr>
+              <a:rPr sz="5400" dirty="0">
+                <a:latin typeface="Arial Narrow" panose="020B0606020202030204" pitchFamily="34" charset="0"/>
+              </a:rPr>
+              <a:t>Código</a:t>
+            </a:r>
           </a:p>
         </p:txBody>
       </p:sp>
       <p:sp>
         <p:nvSpPr>
-          <p:cNvPr id="69" name="Shape 69"/>
+          <p:cNvPr id="72" name="Shape 72"/>
           <p:cNvSpPr>
             <a:spLocks noGrp="1"/>
           </p:cNvSpPr>
@@ -5203,8 +4688,8 @@
         </p:nvSpPr>
         <p:spPr>
           <a:xfrm>
-            <a:off x="560715" y="1519494"/>
-            <a:ext cx="11339515" cy="2633978"/>
+            <a:off x="735792" y="1519494"/>
+            <a:ext cx="11708293" cy="7789606"/>
           </a:xfrm>
           <a:prstGeom prst="rect">
             <a:avLst/>
@@ -5212,79 +4697,366 @@
         </p:spPr>
         <p:txBody>
           <a:bodyPr>
-            <a:normAutofit/>
+            <a:noAutofit/>
           </a:bodyPr>
           <a:lstStyle/>
           <a:p>
-            <a:pPr algn="just"/>
-            <a:r>
-              <a:rPr lang="pt-BR" u="sng" dirty="0">
-                <a:latin typeface="Arial Narrow" panose="020B0606020202030204" pitchFamily="34" charset="0"/>
-              </a:rPr>
-              <a:t>Matriz de adjacência</a:t>
-            </a:r>
-            <a:r>
-              <a:rPr lang="pt-BR" dirty="0">
+            <a:pPr marL="0" indent="0" defTabSz="543305">
+              <a:spcBef>
+                <a:spcPts val="900"/>
+              </a:spcBef>
+              <a:buNone/>
+              <a:defRPr sz="3348"/>
+            </a:pPr>
+            <a:r>
+              <a:rPr lang="en-US" sz="2800" b="1" dirty="0">
+                <a:latin typeface="Arial Narrow" panose="020B0606020202030204" pitchFamily="34" charset="0"/>
+              </a:rPr>
+              <a:t>function </a:t>
+            </a:r>
+            <a:r>
+              <a:rPr lang="en-US" sz="2800" b="1" dirty="0" err="1">
+                <a:latin typeface="Arial Narrow" panose="020B0606020202030204" pitchFamily="34" charset="0"/>
+              </a:rPr>
+              <a:t>reconstruct_path</a:t>
+            </a:r>
+            <a:r>
+              <a:rPr lang="en-US" sz="2800" b="1" dirty="0">
+                <a:latin typeface="Arial Narrow" panose="020B0606020202030204" pitchFamily="34" charset="0"/>
+              </a:rPr>
+              <a:t>(</a:t>
+            </a:r>
+            <a:r>
+              <a:rPr lang="en-US" sz="2800" b="1" dirty="0" err="1">
+                <a:latin typeface="Arial Narrow" panose="020B0606020202030204" pitchFamily="34" charset="0"/>
+              </a:rPr>
+              <a:t>cameFrom</a:t>
+            </a:r>
+            <a:r>
+              <a:rPr lang="en-US" sz="2800" b="1" dirty="0">
+                <a:latin typeface="Arial Narrow" panose="020B0606020202030204" pitchFamily="34" charset="0"/>
+              </a:rPr>
+              <a:t>, current)</a:t>
+            </a:r>
+          </a:p>
+          <a:p>
+            <a:pPr marL="0" indent="0" defTabSz="543305">
+              <a:spcBef>
+                <a:spcPts val="900"/>
+              </a:spcBef>
+              <a:buNone/>
+              <a:defRPr sz="3348"/>
+            </a:pPr>
+            <a:r>
+              <a:rPr lang="en-US" sz="2800" b="1" dirty="0">
+                <a:latin typeface="Arial Narrow" panose="020B0606020202030204" pitchFamily="34" charset="0"/>
+              </a:rPr>
+              <a:t>    </a:t>
+            </a:r>
+            <a:r>
+              <a:rPr lang="en-US" sz="2800" b="1" dirty="0" err="1">
+                <a:latin typeface="Arial Narrow" panose="020B0606020202030204" pitchFamily="34" charset="0"/>
+              </a:rPr>
+              <a:t>total_path</a:t>
+            </a:r>
+            <a:r>
+              <a:rPr lang="en-US" sz="2800" b="1" dirty="0">
+                <a:latin typeface="Arial Narrow" panose="020B0606020202030204" pitchFamily="34" charset="0"/>
+              </a:rPr>
+              <a:t> := {current}</a:t>
+            </a:r>
+          </a:p>
+          <a:p>
+            <a:pPr marL="0" indent="0" defTabSz="543305">
+              <a:spcBef>
+                <a:spcPts val="900"/>
+              </a:spcBef>
+              <a:buNone/>
+              <a:defRPr sz="3348"/>
+            </a:pPr>
+            <a:r>
+              <a:rPr lang="en-US" sz="2800" b="1" dirty="0">
+                <a:latin typeface="Arial Narrow" panose="020B0606020202030204" pitchFamily="34" charset="0"/>
+              </a:rPr>
+              <a:t>    while current in </a:t>
+            </a:r>
+            <a:r>
+              <a:rPr lang="en-US" sz="2800" b="1" dirty="0" err="1">
+                <a:latin typeface="Arial Narrow" panose="020B0606020202030204" pitchFamily="34" charset="0"/>
+              </a:rPr>
+              <a:t>cameFrom.Keys</a:t>
+            </a:r>
+            <a:r>
+              <a:rPr lang="en-US" sz="2800" b="1" dirty="0">
                 <a:latin typeface="Arial Narrow" panose="020B0606020202030204" pitchFamily="34" charset="0"/>
               </a:rPr>
               <a:t>:</a:t>
             </a:r>
           </a:p>
           <a:p>
-            <a:pPr marL="0" indent="0" algn="just">
+            <a:pPr marL="0" indent="0" defTabSz="543305">
+              <a:spcBef>
+                <a:spcPts val="900"/>
+              </a:spcBef>
               <a:buNone/>
+              <a:defRPr sz="3348"/>
             </a:pPr>
             <a:r>
-              <a:rPr lang="pt-BR" dirty="0">
-                <a:latin typeface="Arial Narrow" panose="020B0606020202030204" pitchFamily="34" charset="0"/>
-              </a:rPr>
-              <a:t>	É uma matriz utilizada para representar um grafo. Sua diagonal principal é sempre nula (0). Se o grafo for não direcionado, a matriz é simétrica.</a:t>
+              <a:rPr lang="en-US" sz="2800" b="1" dirty="0">
+                <a:latin typeface="Arial Narrow" panose="020B0606020202030204" pitchFamily="34" charset="0"/>
+              </a:rPr>
+              <a:t>        current := </a:t>
+            </a:r>
+            <a:r>
+              <a:rPr lang="en-US" sz="2800" b="1" dirty="0" err="1">
+                <a:latin typeface="Arial Narrow" panose="020B0606020202030204" pitchFamily="34" charset="0"/>
+              </a:rPr>
+              <a:t>cameFrom</a:t>
+            </a:r>
+            <a:r>
+              <a:rPr lang="en-US" sz="2800" b="1" dirty="0">
+                <a:latin typeface="Arial Narrow" panose="020B0606020202030204" pitchFamily="34" charset="0"/>
+              </a:rPr>
+              <a:t>[current]</a:t>
+            </a:r>
+          </a:p>
+          <a:p>
+            <a:pPr marL="0" indent="0" defTabSz="543305">
+              <a:spcBef>
+                <a:spcPts val="900"/>
+              </a:spcBef>
+              <a:buNone/>
+              <a:defRPr sz="3348"/>
+            </a:pPr>
+            <a:r>
+              <a:rPr lang="en-US" sz="2800" b="1" dirty="0">
+                <a:latin typeface="Arial Narrow" panose="020B0606020202030204" pitchFamily="34" charset="0"/>
+              </a:rPr>
+              <a:t>        </a:t>
+            </a:r>
+            <a:r>
+              <a:rPr lang="en-US" sz="2800" b="1" dirty="0" err="1">
+                <a:latin typeface="Arial Narrow" panose="020B0606020202030204" pitchFamily="34" charset="0"/>
+              </a:rPr>
+              <a:t>total_path.append</a:t>
+            </a:r>
+            <a:r>
+              <a:rPr lang="en-US" sz="2800" b="1" dirty="0">
+                <a:latin typeface="Arial Narrow" panose="020B0606020202030204" pitchFamily="34" charset="0"/>
+              </a:rPr>
+              <a:t>(current)</a:t>
+            </a:r>
+          </a:p>
+          <a:p>
+            <a:pPr marL="0" indent="0" defTabSz="543305">
+              <a:spcBef>
+                <a:spcPts val="900"/>
+              </a:spcBef>
+              <a:buNone/>
+              <a:defRPr sz="3348"/>
+            </a:pPr>
+            <a:r>
+              <a:rPr lang="en-US" sz="2800" b="1" dirty="0">
+                <a:latin typeface="Arial Narrow" panose="020B0606020202030204" pitchFamily="34" charset="0"/>
+              </a:rPr>
+              <a:t>    return </a:t>
+            </a:r>
+            <a:r>
+              <a:rPr lang="en-US" sz="2800" b="1" dirty="0" err="1">
+                <a:latin typeface="Arial Narrow" panose="020B0606020202030204" pitchFamily="34" charset="0"/>
+              </a:rPr>
+              <a:t>total_path</a:t>
+            </a:r>
+            <a:endParaRPr lang="en-US" sz="2800" b="1" dirty="0">
+              <a:latin typeface="Arial Narrow" panose="020B0606020202030204" pitchFamily="34" charset="0"/>
+            </a:endParaRPr>
+          </a:p>
+          <a:p>
+            <a:pPr marL="0" indent="0" defTabSz="543305">
+              <a:spcBef>
+                <a:spcPts val="900"/>
+              </a:spcBef>
+              <a:buNone/>
+              <a:defRPr sz="3348"/>
+            </a:pPr>
+            <a:endParaRPr lang="en-US" sz="2800" dirty="0">
+              <a:latin typeface="Arial Narrow" panose="020B0606020202030204" pitchFamily="34" charset="0"/>
+            </a:endParaRPr>
+          </a:p>
+          <a:p>
+            <a:pPr marL="0" indent="0" defTabSz="543305">
+              <a:spcBef>
+                <a:spcPts val="900"/>
+              </a:spcBef>
+              <a:buNone/>
+              <a:defRPr sz="3348"/>
+            </a:pPr>
+            <a:r>
+              <a:rPr lang="en-US" sz="2800" b="1" dirty="0">
+                <a:latin typeface="Arial Narrow" panose="020B0606020202030204" pitchFamily="34" charset="0"/>
+              </a:rPr>
+              <a:t>function </a:t>
+            </a:r>
+            <a:r>
+              <a:rPr lang="en-US" sz="2800" b="1" dirty="0" err="1">
+                <a:latin typeface="Arial Narrow" panose="020B0606020202030204" pitchFamily="34" charset="0"/>
+              </a:rPr>
+              <a:t>A_Star</a:t>
+            </a:r>
+            <a:r>
+              <a:rPr lang="en-US" sz="2800" b="1" dirty="0">
+                <a:latin typeface="Arial Narrow" panose="020B0606020202030204" pitchFamily="34" charset="0"/>
+              </a:rPr>
+              <a:t>(start, goal)</a:t>
+            </a:r>
+          </a:p>
+          <a:p>
+            <a:pPr marL="0" indent="0" defTabSz="543305">
+              <a:spcBef>
+                <a:spcPts val="900"/>
+              </a:spcBef>
+              <a:buNone/>
+              <a:defRPr sz="3348"/>
+            </a:pPr>
+            <a:r>
+              <a:rPr lang="en-US" sz="2800" dirty="0">
+                <a:latin typeface="Arial Narrow" panose="020B0606020202030204" pitchFamily="34" charset="0"/>
+              </a:rPr>
+              <a:t>    </a:t>
+            </a:r>
+            <a:r>
+              <a:rPr lang="en-US" sz="2800" dirty="0">
+                <a:highlight>
+                  <a:srgbClr val="C0C0C0"/>
+                </a:highlight>
+                <a:latin typeface="Arial Narrow" panose="020B0606020202030204" pitchFamily="34" charset="0"/>
+              </a:rPr>
+              <a:t>// The set of nodes already evaluated</a:t>
+            </a:r>
+          </a:p>
+          <a:p>
+            <a:pPr marL="0" indent="0" defTabSz="543305">
+              <a:spcBef>
+                <a:spcPts val="900"/>
+              </a:spcBef>
+              <a:buNone/>
+              <a:defRPr sz="3348"/>
+            </a:pPr>
+            <a:r>
+              <a:rPr lang="en-US" sz="2800" dirty="0">
+                <a:latin typeface="Arial Narrow" panose="020B0606020202030204" pitchFamily="34" charset="0"/>
+              </a:rPr>
+              <a:t>   </a:t>
+            </a:r>
+            <a:r>
+              <a:rPr lang="en-US" sz="2800" b="1" dirty="0">
+                <a:latin typeface="Arial Narrow" panose="020B0606020202030204" pitchFamily="34" charset="0"/>
+              </a:rPr>
+              <a:t> </a:t>
+            </a:r>
+            <a:r>
+              <a:rPr lang="en-US" sz="2800" b="1" dirty="0" err="1">
+                <a:latin typeface="Arial Narrow" panose="020B0606020202030204" pitchFamily="34" charset="0"/>
+              </a:rPr>
+              <a:t>closedSet</a:t>
+            </a:r>
+            <a:r>
+              <a:rPr lang="en-US" sz="2800" b="1" dirty="0">
+                <a:latin typeface="Arial Narrow" panose="020B0606020202030204" pitchFamily="34" charset="0"/>
+              </a:rPr>
+              <a:t> := {}</a:t>
+            </a:r>
+          </a:p>
+          <a:p>
+            <a:pPr marL="0" indent="0" defTabSz="543305">
+              <a:spcBef>
+                <a:spcPts val="900"/>
+              </a:spcBef>
+              <a:buNone/>
+              <a:defRPr sz="3348"/>
+            </a:pPr>
+            <a:endParaRPr lang="en-US" sz="2800" dirty="0">
+              <a:latin typeface="Arial Narrow" panose="020B0606020202030204" pitchFamily="34" charset="0"/>
+            </a:endParaRPr>
+          </a:p>
+          <a:p>
+            <a:pPr marL="0" indent="0" defTabSz="543305">
+              <a:spcBef>
+                <a:spcPts val="900"/>
+              </a:spcBef>
+              <a:buNone/>
+              <a:defRPr sz="3348"/>
+            </a:pPr>
+            <a:r>
+              <a:rPr lang="en-US" sz="2800" dirty="0">
+                <a:latin typeface="Arial Narrow" panose="020B0606020202030204" pitchFamily="34" charset="0"/>
+              </a:rPr>
+              <a:t>    </a:t>
+            </a:r>
+            <a:r>
+              <a:rPr lang="en-US" sz="2800" dirty="0">
+                <a:highlight>
+                  <a:srgbClr val="C0C0C0"/>
+                </a:highlight>
+                <a:latin typeface="Arial Narrow" panose="020B0606020202030204" pitchFamily="34" charset="0"/>
+              </a:rPr>
+              <a:t>// The set of currently discovered nodes that are not evaluated yet.</a:t>
+            </a:r>
+          </a:p>
+          <a:p>
+            <a:pPr marL="0" indent="0" defTabSz="543305">
+              <a:spcBef>
+                <a:spcPts val="900"/>
+              </a:spcBef>
+              <a:buNone/>
+              <a:defRPr sz="3348"/>
+            </a:pPr>
+            <a:r>
+              <a:rPr lang="en-US" sz="2800" dirty="0">
+                <a:latin typeface="Arial Narrow" panose="020B0606020202030204" pitchFamily="34" charset="0"/>
+              </a:rPr>
+              <a:t>    </a:t>
+            </a:r>
+            <a:r>
+              <a:rPr lang="en-US" sz="2800" dirty="0">
+                <a:highlight>
+                  <a:srgbClr val="C0C0C0"/>
+                </a:highlight>
+                <a:latin typeface="Arial Narrow" panose="020B0606020202030204" pitchFamily="34" charset="0"/>
+              </a:rPr>
+              <a:t>// Initially, only the start node is known.</a:t>
+            </a:r>
+          </a:p>
+          <a:p>
+            <a:pPr marL="0" indent="0" defTabSz="543305">
+              <a:spcBef>
+                <a:spcPts val="900"/>
+              </a:spcBef>
+              <a:buNone/>
+              <a:defRPr sz="3348"/>
+            </a:pPr>
+            <a:r>
+              <a:rPr lang="en-US" sz="2800" dirty="0">
+                <a:latin typeface="Arial Narrow" panose="020B0606020202030204" pitchFamily="34" charset="0"/>
+              </a:rPr>
+              <a:t>    </a:t>
+            </a:r>
+            <a:r>
+              <a:rPr lang="en-US" sz="2800" b="1" dirty="0" err="1">
+                <a:latin typeface="Arial Narrow" panose="020B0606020202030204" pitchFamily="34" charset="0"/>
+              </a:rPr>
+              <a:t>openSet</a:t>
+            </a:r>
+            <a:r>
+              <a:rPr lang="en-US" sz="2800" b="1" dirty="0">
+                <a:latin typeface="Arial Narrow" panose="020B0606020202030204" pitchFamily="34" charset="0"/>
+              </a:rPr>
+              <a:t> := {start}</a:t>
             </a:r>
           </a:p>
         </p:txBody>
       </p:sp>
-      <p:pic>
-        <p:nvPicPr>
-          <p:cNvPr id="5" name="Imagem 4">
-            <a:extLst>
-              <a:ext uri="{FF2B5EF4-FFF2-40B4-BE49-F238E27FC236}">
-                <a16:creationId xmlns:a16="http://schemas.microsoft.com/office/drawing/2014/main" id="{9E335B4D-44E5-4144-9125-96DE09823819}"/>
-              </a:ext>
-            </a:extLst>
-          </p:cNvPr>
-          <p:cNvPicPr>
-            <a:picLocks noChangeAspect="1"/>
-          </p:cNvPicPr>
-          <p:nvPr/>
-        </p:nvPicPr>
-        <p:blipFill>
-          <a:blip r:embed="rId2">
-            <a:extLst>
-              <a:ext uri="{28A0092B-C50C-407E-A947-70E740481C1C}">
-                <a14:useLocalDpi xmlns:a14="http://schemas.microsoft.com/office/drawing/2010/main" val="0"/>
-              </a:ext>
-            </a:extLst>
-          </a:blip>
-          <a:stretch>
-            <a:fillRect/>
-          </a:stretch>
-        </p:blipFill>
-        <p:spPr>
-          <a:xfrm>
-            <a:off x="1706011" y="3949656"/>
-            <a:ext cx="9513266" cy="5784066"/>
-          </a:xfrm>
-          <a:prstGeom prst="rect">
-            <a:avLst/>
-          </a:prstGeom>
-        </p:spPr>
-      </p:pic>
     </p:spTree>
-    <p:extLst>
-      <p:ext uri="{BB962C8B-B14F-4D97-AF65-F5344CB8AC3E}">
-        <p14:creationId xmlns:p14="http://schemas.microsoft.com/office/powerpoint/2010/main" val="2824070561"/>
-      </p:ext>
-    </p:extLst>
   </p:cSld>
   <p:clrMapOvr>
     <a:masterClrMapping/>
@@ -5332,6 +5104,10 @@
           </p:nvPr>
         </p:nvSpPr>
         <p:spPr>
+          <a:xfrm>
+            <a:off x="560715" y="178904"/>
+            <a:ext cx="11883370" cy="1074994"/>
+          </a:xfrm>
           <a:prstGeom prst="rect">
             <a:avLst/>
           </a:prstGeom>
@@ -5363,8 +5139,8 @@
         </p:nvSpPr>
         <p:spPr>
           <a:xfrm>
-            <a:off x="735792" y="1519494"/>
-            <a:ext cx="11708293" cy="7789606"/>
+            <a:off x="735792" y="1252331"/>
+            <a:ext cx="11708293" cy="8322365"/>
           </a:xfrm>
           <a:prstGeom prst="rect">
             <a:avLst/>
@@ -5378,178 +5154,124 @@
           <a:p>
             <a:pPr marL="0" indent="0" defTabSz="543305">
               <a:spcBef>
-                <a:spcPts val="900"/>
+                <a:spcPts val="100"/>
               </a:spcBef>
               <a:buNone/>
               <a:defRPr sz="3348"/>
             </a:pPr>
             <a:r>
-              <a:rPr lang="en-US" sz="2800" b="1" dirty="0">
-                <a:latin typeface="Arial Narrow" panose="020B0606020202030204" pitchFamily="34" charset="0"/>
-              </a:rPr>
-              <a:t>function </a:t>
-            </a:r>
-            <a:r>
-              <a:rPr lang="en-US" sz="2800" b="1" dirty="0" err="1">
-                <a:latin typeface="Arial Narrow" panose="020B0606020202030204" pitchFamily="34" charset="0"/>
-              </a:rPr>
-              <a:t>reconstruct_path</a:t>
-            </a:r>
-            <a:r>
-              <a:rPr lang="en-US" sz="2800" b="1" dirty="0">
-                <a:latin typeface="Arial Narrow" panose="020B0606020202030204" pitchFamily="34" charset="0"/>
-              </a:rPr>
-              <a:t>(</a:t>
-            </a:r>
-            <a:r>
-              <a:rPr lang="en-US" sz="2800" b="1" dirty="0" err="1">
-                <a:latin typeface="Arial Narrow" panose="020B0606020202030204" pitchFamily="34" charset="0"/>
-              </a:rPr>
-              <a:t>cameFrom</a:t>
-            </a:r>
-            <a:r>
-              <a:rPr lang="en-US" sz="2800" b="1" dirty="0">
-                <a:latin typeface="Arial Narrow" panose="020B0606020202030204" pitchFamily="34" charset="0"/>
-              </a:rPr>
-              <a:t>, current)</a:t>
+              <a:rPr lang="en-US" sz="2400" dirty="0">
+                <a:latin typeface="Arial Narrow" panose="020B0606020202030204" pitchFamily="34" charset="0"/>
+              </a:rPr>
+              <a:t>    </a:t>
+            </a:r>
+            <a:r>
+              <a:rPr lang="en-US" sz="2800" dirty="0">
+                <a:highlight>
+                  <a:srgbClr val="C0C0C0"/>
+                </a:highlight>
+                <a:latin typeface="Arial Narrow" panose="020B0606020202030204" pitchFamily="34" charset="0"/>
+              </a:rPr>
+              <a:t>// For each node, which node it can most efficiently be reached from.</a:t>
             </a:r>
           </a:p>
           <a:p>
             <a:pPr marL="0" indent="0" defTabSz="543305">
               <a:spcBef>
-                <a:spcPts val="900"/>
+                <a:spcPts val="100"/>
               </a:spcBef>
               <a:buNone/>
               <a:defRPr sz="3348"/>
             </a:pPr>
             <a:r>
-              <a:rPr lang="en-US" sz="2800" b="1" dirty="0">
+              <a:rPr lang="en-US" sz="2800" dirty="0">
                 <a:latin typeface="Arial Narrow" panose="020B0606020202030204" pitchFamily="34" charset="0"/>
               </a:rPr>
               <a:t>    </a:t>
             </a:r>
             <a:r>
-              <a:rPr lang="en-US" sz="2800" b="1" dirty="0" err="1">
-                <a:latin typeface="Arial Narrow" panose="020B0606020202030204" pitchFamily="34" charset="0"/>
-              </a:rPr>
-              <a:t>total_path</a:t>
-            </a:r>
-            <a:r>
-              <a:rPr lang="en-US" sz="2800" b="1" dirty="0">
-                <a:latin typeface="Arial Narrow" panose="020B0606020202030204" pitchFamily="34" charset="0"/>
-              </a:rPr>
-              <a:t> := {current}</a:t>
+              <a:rPr lang="en-US" sz="2800" dirty="0">
+                <a:highlight>
+                  <a:srgbClr val="C0C0C0"/>
+                </a:highlight>
+                <a:latin typeface="Arial Narrow" panose="020B0606020202030204" pitchFamily="34" charset="0"/>
+              </a:rPr>
+              <a:t>// If a node can be reached from many nodes, </a:t>
+            </a:r>
+            <a:r>
+              <a:rPr lang="en-US" sz="2800" dirty="0" err="1">
+                <a:highlight>
+                  <a:srgbClr val="C0C0C0"/>
+                </a:highlight>
+                <a:latin typeface="Arial Narrow" panose="020B0606020202030204" pitchFamily="34" charset="0"/>
+              </a:rPr>
+              <a:t>cameFrom</a:t>
+            </a:r>
+            <a:r>
+              <a:rPr lang="en-US" sz="2800" dirty="0">
+                <a:highlight>
+                  <a:srgbClr val="C0C0C0"/>
+                </a:highlight>
+                <a:latin typeface="Arial Narrow" panose="020B0606020202030204" pitchFamily="34" charset="0"/>
+              </a:rPr>
+              <a:t> will eventually contain the</a:t>
             </a:r>
           </a:p>
           <a:p>
             <a:pPr marL="0" indent="0" defTabSz="543305">
               <a:spcBef>
-                <a:spcPts val="900"/>
+                <a:spcPts val="100"/>
               </a:spcBef>
               <a:buNone/>
               <a:defRPr sz="3348"/>
             </a:pPr>
             <a:r>
-              <a:rPr lang="en-US" sz="2800" b="1" dirty="0">
-                <a:latin typeface="Arial Narrow" panose="020B0606020202030204" pitchFamily="34" charset="0"/>
-              </a:rPr>
-              <a:t>    while current in </a:t>
-            </a:r>
-            <a:r>
-              <a:rPr lang="en-US" sz="2800" b="1" dirty="0" err="1">
-                <a:latin typeface="Arial Narrow" panose="020B0606020202030204" pitchFamily="34" charset="0"/>
-              </a:rPr>
-              <a:t>cameFrom.Keys</a:t>
-            </a:r>
-            <a:r>
-              <a:rPr lang="en-US" sz="2800" b="1" dirty="0">
-                <a:latin typeface="Arial Narrow" panose="020B0606020202030204" pitchFamily="34" charset="0"/>
-              </a:rPr>
-              <a:t>:</a:t>
+              <a:rPr lang="en-US" sz="2800" dirty="0">
+                <a:latin typeface="Arial Narrow" panose="020B0606020202030204" pitchFamily="34" charset="0"/>
+              </a:rPr>
+              <a:t>    </a:t>
+            </a:r>
+            <a:r>
+              <a:rPr lang="en-US" sz="2800" dirty="0">
+                <a:highlight>
+                  <a:srgbClr val="C0C0C0"/>
+                </a:highlight>
+                <a:latin typeface="Arial Narrow" panose="020B0606020202030204" pitchFamily="34" charset="0"/>
+              </a:rPr>
+              <a:t>// most efficient previous step.</a:t>
             </a:r>
           </a:p>
           <a:p>
             <a:pPr marL="0" indent="0" defTabSz="543305">
               <a:spcBef>
-                <a:spcPts val="900"/>
+                <a:spcPts val="100"/>
               </a:spcBef>
               <a:buNone/>
               <a:defRPr sz="3348"/>
             </a:pPr>
             <a:r>
+              <a:rPr lang="en-US" sz="2800" dirty="0">
+                <a:latin typeface="Arial Narrow" panose="020B0606020202030204" pitchFamily="34" charset="0"/>
+              </a:rPr>
+              <a:t>    </a:t>
+            </a:r>
+            <a:r>
+              <a:rPr lang="en-US" sz="2800" b="1" dirty="0" err="1">
+                <a:latin typeface="Arial Narrow" panose="020B0606020202030204" pitchFamily="34" charset="0"/>
+              </a:rPr>
+              <a:t>cameFrom</a:t>
+            </a:r>
+            <a:r>
               <a:rPr lang="en-US" sz="2800" b="1" dirty="0">
                 <a:latin typeface="Arial Narrow" panose="020B0606020202030204" pitchFamily="34" charset="0"/>
               </a:rPr>
-              <a:t>        current := </a:t>
-            </a:r>
-            <a:r>
-              <a:rPr lang="en-US" sz="2800" b="1" dirty="0" err="1">
-                <a:latin typeface="Arial Narrow" panose="020B0606020202030204" pitchFamily="34" charset="0"/>
-              </a:rPr>
-              <a:t>cameFrom</a:t>
-            </a:r>
-            <a:r>
-              <a:rPr lang="en-US" sz="2800" b="1" dirty="0">
-                <a:latin typeface="Arial Narrow" panose="020B0606020202030204" pitchFamily="34" charset="0"/>
-              </a:rPr>
-              <a:t>[current]</a:t>
+              <a:t> := an empty map</a:t>
             </a:r>
           </a:p>
           <a:p>
             <a:pPr marL="0" indent="0" defTabSz="543305">
               <a:spcBef>
-                <a:spcPts val="900"/>
-              </a:spcBef>
-              <a:buNone/>
-              <a:defRPr sz="3348"/>
-            </a:pPr>
-            <a:r>
-              <a:rPr lang="en-US" sz="2800" b="1" dirty="0">
-                <a:latin typeface="Arial Narrow" panose="020B0606020202030204" pitchFamily="34" charset="0"/>
-              </a:rPr>
-              <a:t>        </a:t>
-            </a:r>
-            <a:r>
-              <a:rPr lang="en-US" sz="2800" b="1" dirty="0" err="1">
-                <a:latin typeface="Arial Narrow" panose="020B0606020202030204" pitchFamily="34" charset="0"/>
-              </a:rPr>
-              <a:t>total_path.append</a:t>
-            </a:r>
-            <a:r>
-              <a:rPr lang="en-US" sz="2800" b="1" dirty="0">
-                <a:latin typeface="Arial Narrow" panose="020B0606020202030204" pitchFamily="34" charset="0"/>
-              </a:rPr>
-              <a:t>(current)</a:t>
-            </a:r>
-          </a:p>
-          <a:p>
-            <a:pPr marL="0" indent="0" defTabSz="543305">
-              <a:spcBef>
-                <a:spcPts val="900"/>
-              </a:spcBef>
-              <a:buNone/>
-              <a:defRPr sz="3348"/>
-            </a:pPr>
-            <a:r>
-              <a:rPr lang="en-US" sz="2800" b="1" dirty="0">
-                <a:latin typeface="Arial Narrow" panose="020B0606020202030204" pitchFamily="34" charset="0"/>
-              </a:rPr>
-              <a:t>    return </a:t>
-            </a:r>
-            <a:r>
-              <a:rPr lang="en-US" sz="2800" b="1" dirty="0" err="1">
-                <a:latin typeface="Arial Narrow" panose="020B0606020202030204" pitchFamily="34" charset="0"/>
-              </a:rPr>
-              <a:t>total_path</a:t>
-            </a:r>
-            <a:endParaRPr lang="en-US" sz="2800" b="1" dirty="0">
-              <a:latin typeface="Arial Narrow" panose="020B0606020202030204" pitchFamily="34" charset="0"/>
-            </a:endParaRPr>
-          </a:p>
-          <a:p>
-            <a:pPr marL="0" indent="0" defTabSz="543305">
-              <a:spcBef>
-                <a:spcPts val="900"/>
+                <a:spcPts val="100"/>
               </a:spcBef>
               <a:buNone/>
               <a:defRPr sz="3348"/>
@@ -5561,34 +5283,31 @@
           <a:p>
             <a:pPr marL="0" indent="0" defTabSz="543305">
               <a:spcBef>
-                <a:spcPts val="900"/>
+                <a:spcPts val="100"/>
               </a:spcBef>
               <a:buNone/>
               <a:defRPr sz="3348"/>
             </a:pPr>
             <a:r>
-              <a:rPr lang="en-US" sz="2800" b="1" dirty="0">
-                <a:latin typeface="Arial Narrow" panose="020B0606020202030204" pitchFamily="34" charset="0"/>
-              </a:rPr>
-              <a:t>function </a:t>
-            </a:r>
-            <a:r>
-              <a:rPr lang="en-US" sz="2800" b="1" dirty="0" err="1">
-                <a:latin typeface="Arial Narrow" panose="020B0606020202030204" pitchFamily="34" charset="0"/>
-              </a:rPr>
-              <a:t>A_Star</a:t>
-            </a:r>
-            <a:r>
-              <a:rPr lang="en-US" sz="2800" b="1" dirty="0">
-                <a:latin typeface="Arial Narrow" panose="020B0606020202030204" pitchFamily="34" charset="0"/>
-              </a:rPr>
-              <a:t>(start, goal)</a:t>
+              <a:rPr lang="en-US" sz="2800" dirty="0">
+                <a:latin typeface="Arial Narrow" panose="020B0606020202030204" pitchFamily="34" charset="0"/>
+              </a:rPr>
+              <a:t>    </a:t>
+            </a:r>
+            <a:r>
+              <a:rPr lang="en-US" sz="2800" dirty="0">
+                <a:highlight>
+                  <a:srgbClr val="C0C0C0"/>
+                </a:highlight>
+                <a:latin typeface="Arial Narrow" panose="020B0606020202030204" pitchFamily="34" charset="0"/>
+              </a:rPr>
+              <a:t>// For each node, the cost of getting from the start node to that node.</a:t>
             </a:r>
           </a:p>
           <a:p>
             <a:pPr marL="0" indent="0" defTabSz="543305">
               <a:spcBef>
-                <a:spcPts val="900"/>
+                <a:spcPts val="100"/>
               </a:spcBef>
               <a:buNone/>
               <a:defRPr sz="3348"/>
@@ -5600,52 +5319,22 @@
               <a:t>    </a:t>
             </a:r>
             <a:r>
-              <a:rPr lang="en-US" sz="2800" dirty="0">
-                <a:highlight>
-                  <a:srgbClr val="C0C0C0"/>
-                </a:highlight>
-                <a:latin typeface="Arial Narrow" panose="020B0606020202030204" pitchFamily="34" charset="0"/>
-              </a:rPr>
-              <a:t>// The set of nodes already evaluated</a:t>
+              <a:rPr lang="en-US" sz="2800" b="1" dirty="0" err="1">
+                <a:latin typeface="Arial Narrow" panose="020B0606020202030204" pitchFamily="34" charset="0"/>
+              </a:rPr>
+              <a:t>gScore</a:t>
+            </a:r>
+            <a:r>
+              <a:rPr lang="en-US" sz="2800" b="1" dirty="0">
+                <a:latin typeface="Arial Narrow" panose="020B0606020202030204" pitchFamily="34" charset="0"/>
+              </a:rPr>
+              <a:t> := map with default value of Infinity</a:t>
             </a:r>
           </a:p>
           <a:p>
             <a:pPr marL="0" indent="0" defTabSz="543305">
               <a:spcBef>
-                <a:spcPts val="900"/>
-              </a:spcBef>
-              <a:buNone/>
-              <a:defRPr sz="3348"/>
-            </a:pPr>
-            <a:r>
-              <a:rPr lang="en-US" sz="2800" dirty="0">
-                <a:latin typeface="Arial Narrow" panose="020B0606020202030204" pitchFamily="34" charset="0"/>
-              </a:rPr>
-              <a:t>   </a:t>
-            </a:r>
-            <a:r>
-              <a:rPr lang="en-US" sz="2800" b="1" dirty="0">
-                <a:latin typeface="Arial Narrow" panose="020B0606020202030204" pitchFamily="34" charset="0"/>
-              </a:rPr>
-              <a:t> </a:t>
-            </a:r>
-            <a:r>
-              <a:rPr lang="en-US" sz="2800" b="1" dirty="0" err="1">
-                <a:latin typeface="Arial Narrow" panose="020B0606020202030204" pitchFamily="34" charset="0"/>
-              </a:rPr>
-              <a:t>closedSet</a:t>
-            </a:r>
-            <a:r>
-              <a:rPr lang="en-US" sz="2800" b="1" dirty="0">
-                <a:latin typeface="Arial Narrow" panose="020B0606020202030204" pitchFamily="34" charset="0"/>
-              </a:rPr>
-              <a:t> := {}</a:t>
-            </a:r>
-          </a:p>
-          <a:p>
-            <a:pPr marL="0" indent="0" defTabSz="543305">
-              <a:spcBef>
-                <a:spcPts val="900"/>
+                <a:spcPts val="100"/>
               </a:spcBef>
               <a:buNone/>
               <a:defRPr sz="3348"/>
@@ -5657,7 +5346,7 @@
           <a:p>
             <a:pPr marL="0" indent="0" defTabSz="543305">
               <a:spcBef>
-                <a:spcPts val="900"/>
+                <a:spcPts val="100"/>
               </a:spcBef>
               <a:buNone/>
               <a:defRPr sz="3348"/>
@@ -5675,13 +5364,13 @@
                 </a:highlight>
                 <a:latin typeface="Arial Narrow" panose="020B0606020202030204" pitchFamily="34" charset="0"/>
               </a:rPr>
-              <a:t>// The set of currently discovered nodes that are not evaluated yet.</a:t>
+              <a:t>// The cost of going from start to start is zero.</a:t>
             </a:r>
           </a:p>
           <a:p>
             <a:pPr marL="0" indent="0" defTabSz="543305">
               <a:spcBef>
-                <a:spcPts val="900"/>
+                <a:spcPts val="100"/>
               </a:spcBef>
               <a:buNone/>
               <a:defRPr sz="3348"/>
@@ -5693,19 +5382,58 @@
               <a:t>    </a:t>
             </a:r>
             <a:r>
+              <a:rPr lang="en-US" sz="2800" b="1" dirty="0" err="1">
+                <a:latin typeface="Arial Narrow" panose="020B0606020202030204" pitchFamily="34" charset="0"/>
+              </a:rPr>
+              <a:t>gScore</a:t>
+            </a:r>
+            <a:r>
+              <a:rPr lang="en-US" sz="2800" b="1" dirty="0">
+                <a:latin typeface="Arial Narrow" panose="020B0606020202030204" pitchFamily="34" charset="0"/>
+              </a:rPr>
+              <a:t>[start] := 0</a:t>
+            </a:r>
+          </a:p>
+          <a:p>
+            <a:pPr marL="0" indent="0" defTabSz="543305">
+              <a:spcBef>
+                <a:spcPts val="100"/>
+              </a:spcBef>
+              <a:buNone/>
+              <a:defRPr sz="3348"/>
+            </a:pPr>
+            <a:endParaRPr lang="en-US" sz="2800" dirty="0">
+              <a:latin typeface="Arial Narrow" panose="020B0606020202030204" pitchFamily="34" charset="0"/>
+            </a:endParaRPr>
+          </a:p>
+          <a:p>
+            <a:pPr marL="0" indent="0" defTabSz="543305">
+              <a:spcBef>
+                <a:spcPts val="100"/>
+              </a:spcBef>
+              <a:buNone/>
+              <a:defRPr sz="3348"/>
+            </a:pPr>
+            <a:r>
+              <a:rPr lang="en-US" sz="2800" dirty="0">
+                <a:latin typeface="Arial Narrow" panose="020B0606020202030204" pitchFamily="34" charset="0"/>
+              </a:rPr>
+              <a:t>    </a:t>
+            </a:r>
+            <a:r>
               <a:rPr lang="en-US" sz="2800" dirty="0">
                 <a:highlight>
                   <a:srgbClr val="C0C0C0"/>
                 </a:highlight>
                 <a:latin typeface="Arial Narrow" panose="020B0606020202030204" pitchFamily="34" charset="0"/>
               </a:rPr>
-              <a:t>// Initially, only the start node is known.</a:t>
+              <a:t>// For each node, the total cost of getting from the start node to the goal</a:t>
             </a:r>
           </a:p>
           <a:p>
             <a:pPr marL="0" indent="0" defTabSz="543305">
               <a:spcBef>
-                <a:spcPts val="900"/>
+                <a:spcPts val="100"/>
               </a:spcBef>
               <a:buNone/>
               <a:defRPr sz="3348"/>
@@ -5717,21 +5445,131 @@
               <a:t>    </a:t>
             </a:r>
             <a:r>
+              <a:rPr lang="en-US" sz="2800" dirty="0">
+                <a:highlight>
+                  <a:srgbClr val="C0C0C0"/>
+                </a:highlight>
+                <a:latin typeface="Arial Narrow" panose="020B0606020202030204" pitchFamily="34" charset="0"/>
+              </a:rPr>
+              <a:t>// by passing by that node. That value is partly known, partly heuristic.</a:t>
+            </a:r>
+          </a:p>
+          <a:p>
+            <a:pPr marL="0" indent="0" defTabSz="543305">
+              <a:spcBef>
+                <a:spcPts val="100"/>
+              </a:spcBef>
+              <a:buNone/>
+              <a:defRPr sz="3348"/>
+            </a:pPr>
+            <a:r>
+              <a:rPr lang="en-US" sz="2800" dirty="0">
+                <a:latin typeface="Arial Narrow" panose="020B0606020202030204" pitchFamily="34" charset="0"/>
+              </a:rPr>
+              <a:t>   </a:t>
+            </a:r>
+            <a:r>
+              <a:rPr lang="en-US" sz="2800" b="1" dirty="0">
+                <a:latin typeface="Arial Narrow" panose="020B0606020202030204" pitchFamily="34" charset="0"/>
+              </a:rPr>
+              <a:t> </a:t>
+            </a:r>
+            <a:r>
               <a:rPr lang="en-US" sz="2800" b="1" dirty="0" err="1">
                 <a:latin typeface="Arial Narrow" panose="020B0606020202030204" pitchFamily="34" charset="0"/>
               </a:rPr>
-              <a:t>openSet</a:t>
+              <a:t>fScore</a:t>
             </a:r>
             <a:r>
               <a:rPr lang="en-US" sz="2800" b="1" dirty="0">
                 <a:latin typeface="Arial Narrow" panose="020B0606020202030204" pitchFamily="34" charset="0"/>
               </a:rPr>
-              <a:t> := {start}</a:t>
+              <a:t> := map with default value of Infinity</a:t>
+            </a:r>
+          </a:p>
+          <a:p>
+            <a:pPr marL="0" indent="0" defTabSz="543305">
+              <a:spcBef>
+                <a:spcPts val="100"/>
+              </a:spcBef>
+              <a:buNone/>
+              <a:defRPr sz="3348"/>
+            </a:pPr>
+            <a:endParaRPr lang="en-US" sz="2800" dirty="0">
+              <a:latin typeface="Arial Narrow" panose="020B0606020202030204" pitchFamily="34" charset="0"/>
+            </a:endParaRPr>
+          </a:p>
+          <a:p>
+            <a:pPr marL="0" indent="0" defTabSz="543305">
+              <a:spcBef>
+                <a:spcPts val="100"/>
+              </a:spcBef>
+              <a:buNone/>
+              <a:defRPr sz="3348"/>
+            </a:pPr>
+            <a:r>
+              <a:rPr lang="en-US" sz="2800" dirty="0">
+                <a:latin typeface="Arial Narrow" panose="020B0606020202030204" pitchFamily="34" charset="0"/>
+              </a:rPr>
+              <a:t>    </a:t>
+            </a:r>
+            <a:r>
+              <a:rPr lang="en-US" sz="2800" dirty="0">
+                <a:highlight>
+                  <a:srgbClr val="C0C0C0"/>
+                </a:highlight>
+                <a:latin typeface="Arial Narrow" panose="020B0606020202030204" pitchFamily="34" charset="0"/>
+              </a:rPr>
+              <a:t>// For the first node, that value is completely heuristic.</a:t>
+            </a:r>
+          </a:p>
+          <a:p>
+            <a:pPr marL="0" indent="0" defTabSz="543305">
+              <a:spcBef>
+                <a:spcPts val="100"/>
+              </a:spcBef>
+              <a:buNone/>
+              <a:defRPr sz="3348"/>
+            </a:pPr>
+            <a:r>
+              <a:rPr lang="en-US" sz="2800" dirty="0">
+                <a:latin typeface="Arial Narrow" panose="020B0606020202030204" pitchFamily="34" charset="0"/>
+              </a:rPr>
+              <a:t>    </a:t>
+            </a:r>
+            <a:r>
+              <a:rPr lang="en-US" sz="2800" b="1" dirty="0" err="1">
+                <a:latin typeface="Arial Narrow" panose="020B0606020202030204" pitchFamily="34" charset="0"/>
+              </a:rPr>
+              <a:t>fScore</a:t>
+            </a:r>
+            <a:r>
+              <a:rPr lang="en-US" sz="2800" b="1" dirty="0">
+                <a:latin typeface="Arial Narrow" panose="020B0606020202030204" pitchFamily="34" charset="0"/>
+              </a:rPr>
+              <a:t>[start] := </a:t>
+            </a:r>
+            <a:r>
+              <a:rPr lang="en-US" sz="2800" b="1" dirty="0" err="1">
+                <a:latin typeface="Arial Narrow" panose="020B0606020202030204" pitchFamily="34" charset="0"/>
+              </a:rPr>
+              <a:t>heuristic_cost_estimate</a:t>
+            </a:r>
+            <a:r>
+              <a:rPr lang="en-US" sz="2800" b="1" dirty="0">
+                <a:latin typeface="Arial Narrow" panose="020B0606020202030204" pitchFamily="34" charset="0"/>
+              </a:rPr>
+              <a:t>(start, goal)</a:t>
             </a:r>
           </a:p>
         </p:txBody>
       </p:sp>
     </p:spTree>
+    <p:extLst>
+      <p:ext uri="{BB962C8B-B14F-4D97-AF65-F5344CB8AC3E}">
+        <p14:creationId xmlns:p14="http://schemas.microsoft.com/office/powerpoint/2010/main" val="2168827275"/>
+      </p:ext>
+    </p:extLst>
   </p:cSld>
   <p:clrMapOvr>
     <a:masterClrMapping/>

</xml_diff>